<commit_message>
Need to finish setup_emac TX
</commit_message>
<xml_diff>
--- a/rckemac_detailed.pptx
+++ b/rckemac_detailed.pptx
@@ -7,8 +7,16 @@
   <p:sldIdLst>
     <p:sldId id="256" r:id="rId2"/>
     <p:sldId id="257" r:id="rId3"/>
-    <p:sldId id="265" r:id="rId4"/>
-    <p:sldId id="264" r:id="rId5"/>
+    <p:sldId id="266" r:id="rId4"/>
+    <p:sldId id="268" r:id="rId5"/>
+    <p:sldId id="269" r:id="rId6"/>
+    <p:sldId id="265" r:id="rId7"/>
+    <p:sldId id="270" r:id="rId8"/>
+    <p:sldId id="273" r:id="rId9"/>
+    <p:sldId id="272" r:id="rId10"/>
+    <p:sldId id="274" r:id="rId11"/>
+    <p:sldId id="275" r:id="rId12"/>
+    <p:sldId id="276" r:id="rId13"/>
   </p:sldIdLst>
   <p:sldSz cx="12192000" cy="6858000"/>
   <p:notesSz cx="6858000" cy="9144000"/>
@@ -341,7 +349,7 @@
           <a:p>
             <a:fld id="{5A069CB8-F204-4D06-B913-C5A26A89888A}" type="datetimeFigureOut">
               <a:rPr lang="en-US" dirty="0"/>
-              <a:t>4/21/2015</a:t>
+              <a:t>4/22/2015</a:t>
             </a:fld>
             <a:endParaRPr lang="en-US" dirty="0"/>
           </a:p>
@@ -544,7 +552,7 @@
           <a:p>
             <a:fld id="{50B6E300-0A13-4A81-945A-7333C271A069}" type="datetimeFigureOut">
               <a:rPr lang="en-US" dirty="0"/>
-              <a:t>4/21/2015</a:t>
+              <a:t>4/22/2015</a:t>
             </a:fld>
             <a:endParaRPr lang="en-US" dirty="0"/>
           </a:p>
@@ -795,7 +803,7 @@
           <a:p>
             <a:fld id="{34671962-1EA4-46E7-BCB0-F36CE46D1A59}" type="datetimeFigureOut">
               <a:rPr lang="en-US" dirty="0"/>
-              <a:t>4/21/2015</a:t>
+              <a:t>4/22/2015</a:t>
             </a:fld>
             <a:endParaRPr lang="en-US" dirty="0"/>
           </a:p>
@@ -960,7 +968,7 @@
           <a:p>
             <a:fld id="{D30BB376-B19C-488D-ABEB-03C7E6E9E3E0}" type="datetimeFigureOut">
               <a:rPr lang="en-US" dirty="0"/>
-              <a:t>4/21/2015</a:t>
+              <a:t>4/22/2015</a:t>
             </a:fld>
             <a:endParaRPr lang="en-US" dirty="0"/>
           </a:p>
@@ -1298,7 +1306,7 @@
           <a:p>
             <a:fld id="{486F077B-A50F-4D64-8574-E2D6A98A5553}" type="datetimeFigureOut">
               <a:rPr lang="en-US" dirty="0"/>
-              <a:t>4/21/2015</a:t>
+              <a:t>4/22/2015</a:t>
             </a:fld>
             <a:endParaRPr lang="en-US" dirty="0"/>
           </a:p>
@@ -1568,7 +1576,7 @@
           <a:p>
             <a:fld id="{7D9E2A62-1983-43A1-A163-D8AA46534C80}" type="datetimeFigureOut">
               <a:rPr lang="en-US" dirty="0"/>
-              <a:t>4/21/2015</a:t>
+              <a:t>4/22/2015</a:t>
             </a:fld>
             <a:endParaRPr lang="en-US" dirty="0"/>
           </a:p>
@@ -1942,7 +1950,7 @@
           <a:p>
             <a:fld id="{898F3E3B-34E3-4345-B2A1-994B83598A9C}" type="datetimeFigureOut">
               <a:rPr lang="en-US" dirty="0"/>
-              <a:t>4/21/2015</a:t>
+              <a:t>4/22/2015</a:t>
             </a:fld>
             <a:endParaRPr lang="en-US" dirty="0"/>
           </a:p>
@@ -2055,7 +2063,7 @@
           <a:p>
             <a:fld id="{FD816C96-82A1-4D77-8ADA-627AC6FE3D65}" type="datetimeFigureOut">
               <a:rPr lang="en-US" dirty="0"/>
-              <a:t>4/21/2015</a:t>
+              <a:t>4/22/2015</a:t>
             </a:fld>
             <a:endParaRPr lang="en-US" dirty="0"/>
           </a:p>
@@ -2221,7 +2229,7 @@
           <a:p>
             <a:fld id="{1D102C1E-28F2-47E9-802D-339E64E2F920}" type="datetimeFigureOut">
               <a:rPr lang="en-US" dirty="0"/>
-              <a:t>4/21/2015</a:t>
+              <a:t>4/22/2015</a:t>
             </a:fld>
             <a:endParaRPr lang="en-US" dirty="0"/>
           </a:p>
@@ -2571,7 +2579,7 @@
           <a:p>
             <a:fld id="{24271A48-F18A-45B3-BC05-1E27DA3F88AF}" type="datetimeFigureOut">
               <a:rPr lang="en-US" dirty="0"/>
-              <a:t>4/21/2015</a:t>
+              <a:t>4/22/2015</a:t>
             </a:fld>
             <a:endParaRPr lang="en-US" dirty="0"/>
           </a:p>
@@ -2944,7 +2952,7 @@
           <a:p>
             <a:fld id="{65B747F8-9654-4282-85D2-65F41AAE7A75}" type="datetimeFigureOut">
               <a:rPr lang="en-US" dirty="0"/>
-              <a:t>4/21/2015</a:t>
+              <a:t>4/22/2015</a:t>
             </a:fld>
             <a:endParaRPr lang="en-US" dirty="0"/>
           </a:p>
@@ -3226,7 +3234,7 @@
           <a:p>
             <a:fld id="{5DC5B261-8843-42D1-AAFC-05E20E2D9B97}" type="datetimeFigureOut">
               <a:rPr lang="en-US" dirty="0"/>
-              <a:t>4/21/2015</a:t>
+              <a:t>4/22/2015</a:t>
             </a:fld>
             <a:endParaRPr lang="en-US" dirty="0"/>
           </a:p>
@@ -3768,13 +3776,19 @@
               <a:rPr lang="en-US" altLang="ko-KR" sz="7200" b="1" dirty="0" err="1" smtClean="0">
                 <a:ea typeface="08서울남산체 B" panose="02020603020101020101" pitchFamily="18" charset="-127"/>
               </a:rPr>
-              <a:t>Rckemac.c</a:t>
+              <a:t>Rckemac</a:t>
             </a:r>
             <a:r>
               <a:rPr lang="en-US" altLang="ko-KR" sz="7200" b="1" dirty="0" smtClean="0">
                 <a:ea typeface="08서울남산체 B" panose="02020603020101020101" pitchFamily="18" charset="-127"/>
               </a:rPr>
-              <a:t> in Detail</a:t>
+              <a:t> </a:t>
+            </a:r>
+            <a:r>
+              <a:rPr lang="en-US" altLang="ko-KR" sz="7200" b="1" dirty="0" smtClean="0">
+                <a:ea typeface="08서울남산체 B" panose="02020603020101020101" pitchFamily="18" charset="-127"/>
+              </a:rPr>
+              <a:t>in Detail</a:t>
             </a:r>
             <a:endParaRPr lang="ko-KR" altLang="en-US" sz="7200" b="1" dirty="0">
               <a:ea typeface="08서울남산체 B" panose="02020603020101020101" pitchFamily="18" charset="-127"/>
@@ -3821,6 +3835,812 @@
     <p:extLst>
       <p:ext uri="{BB962C8B-B14F-4D97-AF65-F5344CB8AC3E}">
         <p14:creationId xmlns:p14="http://schemas.microsoft.com/office/powerpoint/2010/main" val="2616606238"/>
+      </p:ext>
+    </p:extLst>
+  </p:cSld>
+  <p:clrMapOvr>
+    <a:masterClrMapping/>
+  </p:clrMapOvr>
+  <p:timing>
+    <p:tnLst>
+      <p:par>
+        <p:cTn id="1" dur="indefinite" restart="never" nodeType="tmRoot"/>
+      </p:par>
+    </p:tnLst>
+  </p:timing>
+</p:sld>
+</file>
+
+<file path=ppt/slides/slide10.xml><?xml version="1.0" encoding="utf-8"?>
+<p:sld xmlns:a="http://schemas.openxmlformats.org/drawingml/2006/main" xmlns:r="http://schemas.openxmlformats.org/officeDocument/2006/relationships" xmlns:p="http://schemas.openxmlformats.org/presentationml/2006/main">
+  <p:cSld>
+    <p:spTree>
+      <p:nvGrpSpPr>
+        <p:cNvPr id="1" name=""/>
+        <p:cNvGrpSpPr/>
+        <p:nvPr/>
+      </p:nvGrpSpPr>
+      <p:grpSpPr>
+        <a:xfrm>
+          <a:off x="0" y="0"/>
+          <a:ext cx="0" cy="0"/>
+          <a:chOff x="0" y="0"/>
+          <a:chExt cx="0" cy="0"/>
+        </a:xfrm>
+      </p:grpSpPr>
+      <p:sp>
+        <p:nvSpPr>
+          <p:cNvPr id="2" name="Title 1"/>
+          <p:cNvSpPr>
+            <a:spLocks noGrp="1"/>
+          </p:cNvSpPr>
+          <p:nvPr>
+            <p:ph type="title"/>
+          </p:nvPr>
+        </p:nvSpPr>
+        <p:spPr/>
+        <p:txBody>
+          <a:bodyPr/>
+          <a:lstStyle/>
+          <a:p>
+            <a:r>
+              <a:rPr lang="en-US" altLang="ko-KR" dirty="0" err="1" smtClean="0"/>
+              <a:t>emac_open</a:t>
+            </a:r>
+            <a:endParaRPr lang="ko-KR" altLang="en-US" sz="2800" dirty="0"/>
+          </a:p>
+        </p:txBody>
+      </p:sp>
+      <p:sp>
+        <p:nvSpPr>
+          <p:cNvPr id="3" name="Content Placeholder 2"/>
+          <p:cNvSpPr>
+            <a:spLocks noGrp="1"/>
+          </p:cNvSpPr>
+          <p:nvPr>
+            <p:ph idx="1"/>
+          </p:nvPr>
+        </p:nvSpPr>
+        <p:spPr/>
+        <p:txBody>
+          <a:bodyPr numCol="2">
+            <a:normAutofit/>
+          </a:bodyPr>
+          <a:lstStyle/>
+          <a:p>
+            <a:pPr>
+              <a:buFont typeface="Arial" panose="020B0604020202020204" pitchFamily="34" charset="0"/>
+              <a:buChar char="•"/>
+            </a:pPr>
+            <a:r>
+              <a:rPr lang="en-US" altLang="ko-KR" dirty="0" smtClean="0"/>
+              <a:t> </a:t>
+            </a:r>
+            <a:r>
+              <a:rPr lang="en-US" altLang="ko-KR" dirty="0" smtClean="0"/>
+              <a:t>Called when </a:t>
+            </a:r>
+            <a:r>
+              <a:rPr lang="en-US" altLang="ko-KR" dirty="0" err="1" smtClean="0"/>
+              <a:t>eMAC</a:t>
+            </a:r>
+            <a:r>
+              <a:rPr lang="en-US" altLang="ko-KR" dirty="0" smtClean="0"/>
+              <a:t> interface is opened</a:t>
+            </a:r>
+          </a:p>
+          <a:p>
+            <a:pPr marL="457200" indent="-457200">
+              <a:buFont typeface="+mj-lt"/>
+              <a:buAutoNum type="arabicPeriod"/>
+            </a:pPr>
+            <a:r>
+              <a:rPr lang="en-US" altLang="ko-KR" dirty="0" smtClean="0"/>
+              <a:t>Read tile ID and determine core position</a:t>
+            </a:r>
+          </a:p>
+          <a:p>
+            <a:pPr marL="457200" indent="-457200">
+              <a:buFont typeface="+mj-lt"/>
+              <a:buAutoNum type="arabicPeriod"/>
+            </a:pPr>
+            <a:r>
+              <a:rPr lang="en-US" altLang="ko-KR" dirty="0" smtClean="0"/>
+              <a:t>Set interrupt request (IRQ) address</a:t>
+            </a:r>
+          </a:p>
+          <a:p>
+            <a:pPr lvl="1">
+              <a:buFont typeface="Arial" panose="020B0604020202020204" pitchFamily="34" charset="0"/>
+              <a:buChar char="•"/>
+            </a:pPr>
+            <a:r>
+              <a:rPr lang="en-US" altLang="ko-KR" dirty="0" smtClean="0"/>
+              <a:t>Core 0: CRB + 0x10</a:t>
+            </a:r>
+          </a:p>
+          <a:p>
+            <a:pPr lvl="1">
+              <a:buFont typeface="Arial" panose="020B0604020202020204" pitchFamily="34" charset="0"/>
+              <a:buChar char="•"/>
+            </a:pPr>
+            <a:r>
+              <a:rPr lang="en-US" altLang="ko-KR" dirty="0" smtClean="0"/>
+              <a:t>Core 1 : CRB + 0x18</a:t>
+            </a:r>
+          </a:p>
+          <a:p>
+            <a:pPr marL="457200" indent="-457200">
+              <a:buFont typeface="+mj-lt"/>
+              <a:buAutoNum type="arabicPeriod"/>
+            </a:pPr>
+            <a:r>
+              <a:rPr lang="en-US" altLang="ko-KR" dirty="0" smtClean="0"/>
+              <a:t>Get </a:t>
+            </a:r>
+            <a:r>
+              <a:rPr lang="en-US" altLang="ko-KR" i="1" dirty="0" smtClean="0"/>
+              <a:t>offset</a:t>
+            </a:r>
+            <a:r>
+              <a:rPr lang="en-US" altLang="ko-KR" dirty="0" smtClean="0"/>
+              <a:t>, </a:t>
+            </a:r>
+            <a:r>
+              <a:rPr lang="en-US" altLang="ko-KR" i="1" dirty="0" err="1" smtClean="0"/>
+              <a:t>subdest</a:t>
+            </a:r>
+            <a:r>
+              <a:rPr lang="en-US" altLang="ko-KR" dirty="0" smtClean="0"/>
+              <a:t>, </a:t>
+            </a:r>
+            <a:r>
+              <a:rPr lang="en-US" altLang="ko-KR" i="1" dirty="0" smtClean="0"/>
+              <a:t>route</a:t>
+            </a:r>
+            <a:r>
+              <a:rPr lang="en-US" altLang="ko-KR" dirty="0" smtClean="0"/>
+              <a:t>, </a:t>
+            </a:r>
+            <a:r>
+              <a:rPr lang="en-US" altLang="ko-KR" i="1" dirty="0" smtClean="0"/>
+              <a:t>mode</a:t>
+            </a:r>
+          </a:p>
+          <a:p>
+            <a:pPr lvl="1">
+              <a:buFont typeface="Arial" panose="020B0604020202020204" pitchFamily="34" charset="0"/>
+              <a:buChar char="•"/>
+            </a:pPr>
+            <a:r>
+              <a:rPr lang="en-US" altLang="ko-KR" dirty="0" smtClean="0"/>
+              <a:t>First read value from (CRB + 0x800, Core 0) or (CRB + 0x1000, Core 1)</a:t>
+            </a:r>
+          </a:p>
+          <a:p>
+            <a:pPr lvl="1">
+              <a:buFont typeface="Arial" panose="020B0604020202020204" pitchFamily="34" charset="0"/>
+              <a:buChar char="•"/>
+            </a:pPr>
+            <a:r>
+              <a:rPr lang="en-US" altLang="ko-KR" dirty="0" smtClean="0"/>
+              <a:t>Calculate </a:t>
+            </a:r>
+            <a:r>
+              <a:rPr lang="en-US" altLang="ko-KR" i="1" dirty="0" smtClean="0"/>
+              <a:t>offset</a:t>
+            </a:r>
+            <a:r>
+              <a:rPr lang="en-US" altLang="ko-KR" dirty="0" smtClean="0"/>
+              <a:t>, etc. by shifting this value</a:t>
+            </a:r>
+          </a:p>
+          <a:p>
+            <a:pPr marL="457200" indent="-457200">
+              <a:buFont typeface="+mj-lt"/>
+              <a:buAutoNum type="arabicPeriod"/>
+            </a:pPr>
+            <a:r>
+              <a:rPr lang="en-US" altLang="ko-KR" dirty="0" smtClean="0"/>
+              <a:t>Setup Ethernet port (</a:t>
+            </a:r>
+            <a:r>
+              <a:rPr lang="en-US" altLang="ko-KR" i="1" dirty="0" err="1" smtClean="0"/>
+              <a:t>setup_emac</a:t>
+            </a:r>
+            <a:r>
+              <a:rPr lang="en-US" altLang="ko-KR" dirty="0" smtClean="0"/>
+              <a:t>)</a:t>
+            </a:r>
+          </a:p>
+          <a:p>
+            <a:pPr marL="457200" indent="-457200">
+              <a:buFont typeface="+mj-lt"/>
+              <a:buAutoNum type="arabicPeriod"/>
+            </a:pPr>
+            <a:r>
+              <a:rPr lang="en-US" altLang="ko-KR" dirty="0" smtClean="0"/>
+              <a:t>Set network address</a:t>
+            </a:r>
+          </a:p>
+          <a:p>
+            <a:pPr lvl="1">
+              <a:buFont typeface="Arial" panose="020B0604020202020204" pitchFamily="34" charset="0"/>
+              <a:buChar char="•"/>
+            </a:pPr>
+            <a:r>
+              <a:rPr lang="en-US" altLang="ko-KR" dirty="0" smtClean="0"/>
+              <a:t>First get MAC address (</a:t>
+            </a:r>
+            <a:r>
+              <a:rPr lang="en-US" altLang="ko-KR" i="1" dirty="0" err="1" smtClean="0"/>
+              <a:t>get_mac_address</a:t>
+            </a:r>
+            <a:r>
+              <a:rPr lang="en-US" altLang="ko-KR" dirty="0" smtClean="0"/>
+              <a:t>)</a:t>
+            </a:r>
+          </a:p>
+          <a:p>
+            <a:pPr lvl="1">
+              <a:buFont typeface="Arial" panose="020B0604020202020204" pitchFamily="34" charset="0"/>
+              <a:buChar char="•"/>
+            </a:pPr>
+            <a:r>
+              <a:rPr lang="en-US" altLang="ko-KR" dirty="0" smtClean="0"/>
+              <a:t>And iterate </a:t>
+            </a:r>
+            <a:r>
+              <a:rPr lang="en-US" altLang="ko-KR" i="1" dirty="0" smtClean="0"/>
+              <a:t>for</a:t>
+            </a:r>
+            <a:r>
+              <a:rPr lang="en-US" altLang="ko-KR" dirty="0" smtClean="0"/>
+              <a:t> loop to consecutively save lower 8 bits of address in </a:t>
+            </a:r>
+            <a:r>
+              <a:rPr lang="en-US" altLang="ko-KR" i="1" dirty="0" smtClean="0"/>
+              <a:t>dev-&gt;</a:t>
+            </a:r>
+            <a:r>
+              <a:rPr lang="en-US" altLang="ko-KR" i="1" dirty="0" err="1" smtClean="0"/>
+              <a:t>dev_addr</a:t>
+            </a:r>
+            <a:endParaRPr lang="en-US" altLang="ko-KR" i="1" dirty="0" smtClean="0"/>
+          </a:p>
+          <a:p>
+            <a:pPr marL="457200" indent="-457200">
+              <a:buFont typeface="+mj-lt"/>
+              <a:buAutoNum type="arabicPeriod"/>
+            </a:pPr>
+            <a:r>
+              <a:rPr lang="en-US" altLang="ko-KR" dirty="0" smtClean="0"/>
+              <a:t>Enable interrupt</a:t>
+            </a:r>
+          </a:p>
+          <a:p>
+            <a:pPr lvl="1">
+              <a:buFont typeface="Arial" panose="020B0604020202020204" pitchFamily="34" charset="0"/>
+              <a:buChar char="•"/>
+            </a:pPr>
+            <a:r>
+              <a:rPr lang="en-US" altLang="ko-KR" dirty="0" smtClean="0"/>
+              <a:t>Clear interrupt (</a:t>
+            </a:r>
+            <a:r>
+              <a:rPr lang="en-US" altLang="ko-KR" i="1" dirty="0" err="1" smtClean="0"/>
+              <a:t>emac_clear_interrupt</a:t>
+            </a:r>
+            <a:r>
+              <a:rPr lang="en-US" altLang="ko-KR" dirty="0" smtClean="0"/>
+              <a:t>)</a:t>
+            </a:r>
+          </a:p>
+          <a:p>
+            <a:pPr lvl="1">
+              <a:buFont typeface="Arial" panose="020B0604020202020204" pitchFamily="34" charset="0"/>
+              <a:buChar char="•"/>
+            </a:pPr>
+            <a:r>
+              <a:rPr lang="en-US" altLang="ko-KR" dirty="0" smtClean="0"/>
+              <a:t>Read value from (GRB + 0xD200 + </a:t>
+            </a:r>
+            <a:r>
+              <a:rPr lang="en-US" altLang="ko-KR" dirty="0" err="1" smtClean="0"/>
+              <a:t>priv</a:t>
+            </a:r>
+            <a:r>
+              <a:rPr lang="en-US" altLang="ko-KR" dirty="0" smtClean="0"/>
+              <a:t>-&gt;</a:t>
+            </a:r>
+            <a:r>
+              <a:rPr lang="en-US" altLang="ko-KR" dirty="0" err="1" smtClean="0"/>
+              <a:t>pid</a:t>
+            </a:r>
+            <a:r>
+              <a:rPr lang="en-US" altLang="ko-KR" dirty="0" smtClean="0"/>
+              <a:t> * 2 * 4) and change it</a:t>
+            </a:r>
+          </a:p>
+          <a:p>
+            <a:pPr lvl="1">
+              <a:buFont typeface="Arial" panose="020B0604020202020204" pitchFamily="34" charset="0"/>
+              <a:buChar char="•"/>
+            </a:pPr>
+            <a:r>
+              <a:rPr lang="en-US" altLang="ko-KR" dirty="0" smtClean="0"/>
+              <a:t>Change value in (GRB + 0xD800+ </a:t>
+            </a:r>
+            <a:r>
+              <a:rPr lang="en-US" altLang="ko-KR" dirty="0" err="1" smtClean="0"/>
+              <a:t>priv</a:t>
+            </a:r>
+            <a:r>
+              <a:rPr lang="en-US" altLang="ko-KR" dirty="0" smtClean="0"/>
+              <a:t>-&gt;</a:t>
+            </a:r>
+            <a:r>
+              <a:rPr lang="en-US" altLang="ko-KR" dirty="0" err="1" smtClean="0"/>
+              <a:t>pid</a:t>
+            </a:r>
+            <a:r>
+              <a:rPr lang="en-US" altLang="ko-KR" dirty="0" smtClean="0"/>
+              <a:t> * 4)</a:t>
+            </a:r>
+          </a:p>
+          <a:p>
+            <a:pPr lvl="1">
+              <a:buFont typeface="Arial" panose="020B0604020202020204" pitchFamily="34" charset="0"/>
+              <a:buChar char="•"/>
+            </a:pPr>
+            <a:r>
+              <a:rPr lang="en-US" altLang="ko-KR" dirty="0" smtClean="0"/>
+              <a:t>Call </a:t>
+            </a:r>
+            <a:r>
+              <a:rPr lang="en-US" altLang="ko-KR" i="1" dirty="0" err="1" smtClean="0"/>
+              <a:t>request_irq</a:t>
+            </a:r>
+            <a:r>
+              <a:rPr lang="en-US" altLang="ko-KR" dirty="0" smtClean="0"/>
+              <a:t> and check its return value</a:t>
+            </a:r>
+          </a:p>
+          <a:p>
+            <a:pPr marL="365760" indent="-457200">
+              <a:buFont typeface="+mj-lt"/>
+              <a:buAutoNum type="arabicPeriod"/>
+            </a:pPr>
+            <a:r>
+              <a:rPr lang="en-US" altLang="ko-KR" dirty="0" smtClean="0"/>
+              <a:t>Start network queue (</a:t>
+            </a:r>
+            <a:r>
+              <a:rPr lang="en-US" altLang="ko-KR" i="1" dirty="0" err="1" smtClean="0"/>
+              <a:t>netif_start_queue</a:t>
+            </a:r>
+            <a:r>
+              <a:rPr lang="en-US" altLang="ko-KR" dirty="0" smtClean="0"/>
+              <a:t>)</a:t>
+            </a:r>
+          </a:p>
+        </p:txBody>
+      </p:sp>
+    </p:spTree>
+    <p:extLst>
+      <p:ext uri="{BB962C8B-B14F-4D97-AF65-F5344CB8AC3E}">
+        <p14:creationId xmlns:p14="http://schemas.microsoft.com/office/powerpoint/2010/main" val="967349924"/>
+      </p:ext>
+    </p:extLst>
+  </p:cSld>
+  <p:clrMapOvr>
+    <a:masterClrMapping/>
+  </p:clrMapOvr>
+  <p:timing>
+    <p:tnLst>
+      <p:par>
+        <p:cTn id="1" dur="indefinite" restart="never" nodeType="tmRoot"/>
+      </p:par>
+    </p:tnLst>
+  </p:timing>
+</p:sld>
+</file>
+
+<file path=ppt/slides/slide11.xml><?xml version="1.0" encoding="utf-8"?>
+<p:sld xmlns:a="http://schemas.openxmlformats.org/drawingml/2006/main" xmlns:r="http://schemas.openxmlformats.org/officeDocument/2006/relationships" xmlns:p="http://schemas.openxmlformats.org/presentationml/2006/main">
+  <p:cSld>
+    <p:spTree>
+      <p:nvGrpSpPr>
+        <p:cNvPr id="1" name=""/>
+        <p:cNvGrpSpPr/>
+        <p:nvPr/>
+      </p:nvGrpSpPr>
+      <p:grpSpPr>
+        <a:xfrm>
+          <a:off x="0" y="0"/>
+          <a:ext cx="0" cy="0"/>
+          <a:chOff x="0" y="0"/>
+          <a:chExt cx="0" cy="0"/>
+        </a:xfrm>
+      </p:grpSpPr>
+      <p:sp>
+        <p:nvSpPr>
+          <p:cNvPr id="2" name="Title 1"/>
+          <p:cNvSpPr>
+            <a:spLocks noGrp="1"/>
+          </p:cNvSpPr>
+          <p:nvPr>
+            <p:ph type="title"/>
+          </p:nvPr>
+        </p:nvSpPr>
+        <p:spPr/>
+        <p:txBody>
+          <a:bodyPr/>
+          <a:lstStyle/>
+          <a:p>
+            <a:r>
+              <a:rPr lang="en-US" altLang="ko-KR" dirty="0" err="1" smtClean="0"/>
+              <a:t>setup_emac</a:t>
+            </a:r>
+            <a:endParaRPr lang="ko-KR" altLang="en-US" sz="2800" dirty="0"/>
+          </a:p>
+        </p:txBody>
+      </p:sp>
+      <p:sp>
+        <p:nvSpPr>
+          <p:cNvPr id="3" name="Content Placeholder 2"/>
+          <p:cNvSpPr>
+            <a:spLocks noGrp="1"/>
+          </p:cNvSpPr>
+          <p:nvPr>
+            <p:ph idx="1"/>
+          </p:nvPr>
+        </p:nvSpPr>
+        <p:spPr/>
+        <p:txBody>
+          <a:bodyPr numCol="2">
+            <a:normAutofit/>
+          </a:bodyPr>
+          <a:lstStyle/>
+          <a:p>
+            <a:pPr>
+              <a:buFont typeface="Arial" panose="020B0604020202020204" pitchFamily="34" charset="0"/>
+              <a:buChar char="•"/>
+            </a:pPr>
+            <a:r>
+              <a:rPr lang="en-US" altLang="ko-KR" sz="1600" dirty="0" smtClean="0"/>
+              <a:t> </a:t>
+            </a:r>
+            <a:r>
+              <a:rPr lang="en-US" altLang="ko-KR" sz="1600" dirty="0" smtClean="0"/>
+              <a:t>Called from </a:t>
+            </a:r>
+            <a:r>
+              <a:rPr lang="en-US" altLang="ko-KR" sz="1600" i="1" dirty="0" err="1" smtClean="0"/>
+              <a:t>emac_open</a:t>
+            </a:r>
+            <a:endParaRPr lang="en-US" altLang="ko-KR" sz="1600" i="1" dirty="0"/>
+          </a:p>
+          <a:p>
+            <a:pPr>
+              <a:buFont typeface="Arial" panose="020B0604020202020204" pitchFamily="34" charset="0"/>
+              <a:buChar char="•"/>
+            </a:pPr>
+            <a:r>
+              <a:rPr lang="en-US" altLang="ko-KR" sz="1600" dirty="0" smtClean="0"/>
+              <a:t> Reception configuration</a:t>
+            </a:r>
+          </a:p>
+          <a:p>
+            <a:pPr marL="544068" lvl="1" indent="-342900">
+              <a:buFont typeface="+mj-lt"/>
+              <a:buAutoNum type="arabicPeriod"/>
+            </a:pPr>
+            <a:r>
+              <a:rPr lang="en-US" altLang="ko-KR" sz="1400" dirty="0" smtClean="0"/>
+              <a:t>Set up ring buffer space</a:t>
+            </a:r>
+          </a:p>
+          <a:p>
+            <a:pPr lvl="2">
+              <a:buFont typeface="Arial" panose="020B0604020202020204" pitchFamily="34" charset="0"/>
+              <a:buChar char="•"/>
+            </a:pPr>
+            <a:r>
+              <a:rPr lang="en-US" altLang="ko-KR" sz="1100" dirty="0" smtClean="0"/>
+              <a:t>Set </a:t>
+            </a:r>
+            <a:r>
+              <a:rPr lang="en-US" altLang="ko-KR" sz="1100" i="1" dirty="0" err="1" smtClean="0"/>
+              <a:t>priv</a:t>
+            </a:r>
+            <a:r>
+              <a:rPr lang="en-US" altLang="ko-KR" sz="1100" i="1" dirty="0" smtClean="0"/>
+              <a:t>-&gt;</a:t>
+            </a:r>
+            <a:r>
+              <a:rPr lang="en-US" altLang="ko-KR" sz="1100" i="1" dirty="0" err="1" smtClean="0"/>
+              <a:t>rx_buffer_max</a:t>
+            </a:r>
+            <a:endParaRPr lang="en-US" altLang="ko-KR" sz="1100" i="1" dirty="0" smtClean="0"/>
+          </a:p>
+          <a:p>
+            <a:pPr lvl="2">
+              <a:buFont typeface="Arial" panose="020B0604020202020204" pitchFamily="34" charset="0"/>
+              <a:buChar char="•"/>
+            </a:pPr>
+            <a:r>
+              <a:rPr lang="en-US" altLang="ko-KR" sz="1100" dirty="0" smtClean="0"/>
+              <a:t>Allocate </a:t>
+            </a:r>
+            <a:r>
+              <a:rPr lang="en-US" altLang="ko-KR" sz="1100" i="1" dirty="0" err="1" smtClean="0"/>
+              <a:t>priv</a:t>
+            </a:r>
+            <a:r>
+              <a:rPr lang="en-US" altLang="ko-KR" sz="1100" i="1" dirty="0" smtClean="0"/>
+              <a:t>-&gt;</a:t>
+            </a:r>
+            <a:r>
+              <a:rPr lang="en-US" altLang="ko-KR" sz="1100" i="1" dirty="0" err="1" smtClean="0"/>
+              <a:t>rx_buffer</a:t>
+            </a:r>
+            <a:r>
+              <a:rPr lang="en-US" altLang="ko-KR" sz="1100" i="1" dirty="0" smtClean="0"/>
+              <a:t> </a:t>
+            </a:r>
+            <a:r>
+              <a:rPr lang="en-US" altLang="ko-KR" sz="1100" dirty="0" smtClean="0"/>
+              <a:t>using </a:t>
+            </a:r>
+            <a:r>
+              <a:rPr lang="en-US" altLang="ko-KR" sz="1100" dirty="0" err="1" smtClean="0"/>
+              <a:t>alloc_buffer</a:t>
+            </a:r>
+            <a:endParaRPr lang="en-US" altLang="ko-KR" sz="1100" dirty="0" smtClean="0"/>
+          </a:p>
+          <a:p>
+            <a:pPr marL="544068" lvl="1" indent="-342900">
+              <a:buFont typeface="+mj-lt"/>
+              <a:buAutoNum type="arabicPeriod"/>
+            </a:pPr>
+            <a:r>
+              <a:rPr lang="en-US" altLang="ko-KR" sz="1400" dirty="0" smtClean="0"/>
+              <a:t>Set start address of RX buffer (GRB + 0x9000)</a:t>
+            </a:r>
+            <a:endParaRPr lang="en-US" altLang="ko-KR" sz="1400" dirty="0"/>
+          </a:p>
+          <a:p>
+            <a:pPr marL="544068" lvl="1" indent="-342900">
+              <a:buFont typeface="+mj-lt"/>
+              <a:buAutoNum type="arabicPeriod"/>
+            </a:pPr>
+            <a:r>
+              <a:rPr lang="en-US" altLang="ko-KR" sz="1400" dirty="0" smtClean="0"/>
+              <a:t>Read RX buffer write offset (GRB + 0x9200)</a:t>
+            </a:r>
+          </a:p>
+          <a:p>
+            <a:pPr marL="544068" lvl="1" indent="-342900">
+              <a:buFont typeface="+mj-lt"/>
+              <a:buAutoNum type="arabicPeriod"/>
+            </a:pPr>
+            <a:r>
+              <a:rPr lang="en-US" altLang="ko-KR" sz="1400" dirty="0" smtClean="0"/>
+              <a:t>Set RX buffer write offset to RX buffer read offset (GRB + 0x9100)</a:t>
+            </a:r>
+          </a:p>
+          <a:p>
+            <a:pPr marL="544068" lvl="1" indent="-342900">
+              <a:buFont typeface="+mj-lt"/>
+              <a:buAutoNum type="arabicPeriod"/>
+            </a:pPr>
+            <a:r>
+              <a:rPr lang="en-US" altLang="ko-KR" sz="1400" dirty="0" smtClean="0"/>
+              <a:t>Set RX buffer size (GRB + 0x9300)</a:t>
+            </a:r>
+          </a:p>
+          <a:p>
+            <a:pPr marL="544068" lvl="1" indent="-342900">
+              <a:buFont typeface="+mj-lt"/>
+              <a:buAutoNum type="arabicPeriod"/>
+            </a:pPr>
+            <a:r>
+              <a:rPr lang="en-US" altLang="ko-KR" sz="1400" dirty="0" smtClean="0"/>
+              <a:t>Set RX buffer threshold (GRB + 0x9400)</a:t>
+            </a:r>
+          </a:p>
+          <a:p>
+            <a:pPr marL="544068" lvl="1" indent="-342900">
+              <a:buFont typeface="+mj-lt"/>
+              <a:buAutoNum type="arabicPeriod"/>
+            </a:pPr>
+            <a:r>
+              <a:rPr lang="en-US" altLang="ko-KR" sz="1400" dirty="0" smtClean="0"/>
+              <a:t>Set RX mode (GRB + 0x9500)</a:t>
+            </a:r>
+          </a:p>
+          <a:p>
+            <a:pPr marL="544068" lvl="1" indent="-342900">
+              <a:buFont typeface="+mj-lt"/>
+              <a:buAutoNum type="arabicPeriod"/>
+            </a:pPr>
+            <a:r>
+              <a:rPr lang="en-US" altLang="ko-KR" sz="1400" dirty="0" smtClean="0"/>
+              <a:t>Save MAC address (HI: GRB + 0x9600, LO: GRB + 0x9700)</a:t>
+            </a:r>
+          </a:p>
+          <a:p>
+            <a:pPr marL="544068" lvl="1" indent="-342900">
+              <a:buFont typeface="+mj-lt"/>
+              <a:buAutoNum type="arabicPeriod"/>
+            </a:pPr>
+            <a:r>
+              <a:rPr lang="en-US" altLang="ko-KR" sz="1400" dirty="0" smtClean="0"/>
+              <a:t>Activate network port (GRB + 0x9800)</a:t>
+            </a:r>
+          </a:p>
+          <a:p>
+            <a:pPr marL="544068" lvl="1" indent="-342900">
+              <a:buFont typeface="+mj-lt"/>
+              <a:buAutoNum type="arabicPeriod"/>
+            </a:pPr>
+            <a:endParaRPr lang="en-US" altLang="ko-KR" sz="1400" dirty="0"/>
+          </a:p>
+          <a:p>
+            <a:pPr>
+              <a:buFont typeface="Arial" panose="020B0604020202020204" pitchFamily="34" charset="0"/>
+              <a:buChar char="•"/>
+            </a:pPr>
+            <a:r>
+              <a:rPr lang="en-US" altLang="ko-KR" sz="1600" dirty="0" smtClean="0"/>
+              <a:t>Transmission configuration</a:t>
+            </a:r>
+          </a:p>
+        </p:txBody>
+      </p:sp>
+    </p:spTree>
+    <p:extLst>
+      <p:ext uri="{BB962C8B-B14F-4D97-AF65-F5344CB8AC3E}">
+        <p14:creationId xmlns:p14="http://schemas.microsoft.com/office/powerpoint/2010/main" val="2112014622"/>
+      </p:ext>
+    </p:extLst>
+  </p:cSld>
+  <p:clrMapOvr>
+    <a:masterClrMapping/>
+  </p:clrMapOvr>
+  <p:timing>
+    <p:tnLst>
+      <p:par>
+        <p:cTn id="1" dur="indefinite" restart="never" nodeType="tmRoot"/>
+      </p:par>
+    </p:tnLst>
+  </p:timing>
+</p:sld>
+</file>
+
+<file path=ppt/slides/slide12.xml><?xml version="1.0" encoding="utf-8"?>
+<p:sld xmlns:a="http://schemas.openxmlformats.org/drawingml/2006/main" xmlns:r="http://schemas.openxmlformats.org/officeDocument/2006/relationships" xmlns:p="http://schemas.openxmlformats.org/presentationml/2006/main">
+  <p:cSld>
+    <p:spTree>
+      <p:nvGrpSpPr>
+        <p:cNvPr id="1" name=""/>
+        <p:cNvGrpSpPr/>
+        <p:nvPr/>
+      </p:nvGrpSpPr>
+      <p:grpSpPr>
+        <a:xfrm>
+          <a:off x="0" y="0"/>
+          <a:ext cx="0" cy="0"/>
+          <a:chOff x="0" y="0"/>
+          <a:chExt cx="0" cy="0"/>
+        </a:xfrm>
+      </p:grpSpPr>
+      <p:sp>
+        <p:nvSpPr>
+          <p:cNvPr id="2" name="Title 1"/>
+          <p:cNvSpPr>
+            <a:spLocks noGrp="1"/>
+          </p:cNvSpPr>
+          <p:nvPr>
+            <p:ph type="title"/>
+          </p:nvPr>
+        </p:nvSpPr>
+        <p:spPr/>
+        <p:txBody>
+          <a:bodyPr/>
+          <a:lstStyle/>
+          <a:p>
+            <a:r>
+              <a:rPr lang="en-US" altLang="ko-KR" dirty="0" smtClean="0"/>
+              <a:t>TODO</a:t>
+            </a:r>
+            <a:endParaRPr lang="ko-KR" altLang="en-US" sz="2800" dirty="0"/>
+          </a:p>
+        </p:txBody>
+      </p:sp>
+      <p:sp>
+        <p:nvSpPr>
+          <p:cNvPr id="3" name="Content Placeholder 2"/>
+          <p:cNvSpPr>
+            <a:spLocks noGrp="1"/>
+          </p:cNvSpPr>
+          <p:nvPr>
+            <p:ph idx="1"/>
+          </p:nvPr>
+        </p:nvSpPr>
+        <p:spPr/>
+        <p:txBody>
+          <a:bodyPr numCol="1">
+            <a:normAutofit/>
+          </a:bodyPr>
+          <a:lstStyle/>
+          <a:p>
+            <a:pPr>
+              <a:buFont typeface="Arial" panose="020B0604020202020204" pitchFamily="34" charset="0"/>
+              <a:buChar char="•"/>
+            </a:pPr>
+            <a:r>
+              <a:rPr lang="en-US" altLang="ko-KR" dirty="0" smtClean="0"/>
+              <a:t> </a:t>
+            </a:r>
+            <a:r>
+              <a:rPr lang="en-US" altLang="ko-KR" dirty="0" err="1" smtClean="0"/>
+              <a:t>emac_rx</a:t>
+            </a:r>
+            <a:endParaRPr lang="en-US" altLang="ko-KR" dirty="0" smtClean="0"/>
+          </a:p>
+          <a:p>
+            <a:pPr>
+              <a:buFont typeface="Arial" panose="020B0604020202020204" pitchFamily="34" charset="0"/>
+              <a:buChar char="•"/>
+            </a:pPr>
+            <a:r>
+              <a:rPr lang="en-US" altLang="ko-KR" dirty="0" smtClean="0"/>
+              <a:t> </a:t>
+            </a:r>
+            <a:r>
+              <a:rPr lang="en-US" altLang="ko-KR" dirty="0" err="1" smtClean="0"/>
+              <a:t>emac_tx</a:t>
+            </a:r>
+            <a:endParaRPr lang="en-US" altLang="ko-KR" dirty="0" smtClean="0"/>
+          </a:p>
+          <a:p>
+            <a:pPr>
+              <a:buFont typeface="Arial" panose="020B0604020202020204" pitchFamily="34" charset="0"/>
+              <a:buChar char="•"/>
+            </a:pPr>
+            <a:r>
+              <a:rPr lang="en-US" altLang="ko-KR" dirty="0"/>
+              <a:t> </a:t>
+            </a:r>
+            <a:r>
+              <a:rPr lang="en-US" altLang="ko-KR" dirty="0" err="1" smtClean="0"/>
+              <a:t>emac_stop</a:t>
+            </a:r>
+            <a:endParaRPr lang="en-US" altLang="ko-KR" dirty="0" smtClean="0"/>
+          </a:p>
+          <a:p>
+            <a:pPr>
+              <a:buFont typeface="Arial" panose="020B0604020202020204" pitchFamily="34" charset="0"/>
+              <a:buChar char="•"/>
+            </a:pPr>
+            <a:r>
+              <a:rPr lang="en-US" altLang="ko-KR" dirty="0"/>
+              <a:t> </a:t>
+            </a:r>
+            <a:r>
+              <a:rPr lang="en-US" altLang="ko-KR" dirty="0" err="1" smtClean="0"/>
+              <a:t>emac_module_exit</a:t>
+            </a:r>
+            <a:endParaRPr lang="en-US" altLang="ko-KR" dirty="0" smtClean="0"/>
+          </a:p>
+        </p:txBody>
+      </p:sp>
+    </p:spTree>
+    <p:extLst>
+      <p:ext uri="{BB962C8B-B14F-4D97-AF65-F5344CB8AC3E}">
+        <p14:creationId xmlns:p14="http://schemas.microsoft.com/office/powerpoint/2010/main" val="4030590673"/>
       </p:ext>
     </p:extLst>
   </p:cSld>
@@ -3877,6 +4697,467 @@
           </a:p>
         </p:txBody>
       </p:sp>
+      <p:grpSp>
+        <p:nvGrpSpPr>
+          <p:cNvPr id="20" name="Group 19"/>
+          <p:cNvGrpSpPr/>
+          <p:nvPr/>
+        </p:nvGrpSpPr>
+        <p:grpSpPr>
+          <a:xfrm>
+            <a:off x="3571170" y="2195452"/>
+            <a:ext cx="5110620" cy="3725898"/>
+            <a:chOff x="3263359" y="1990915"/>
+            <a:chExt cx="5726242" cy="4174717"/>
+          </a:xfrm>
+        </p:grpSpPr>
+        <p:sp>
+          <p:nvSpPr>
+            <p:cNvPr id="13" name="Rectangle 12"/>
+            <p:cNvSpPr/>
+            <p:nvPr/>
+          </p:nvSpPr>
+          <p:spPr>
+            <a:xfrm>
+              <a:off x="3263359" y="3534826"/>
+              <a:ext cx="5726242" cy="1078471"/>
+            </a:xfrm>
+            <a:prstGeom prst="rect">
+              <a:avLst/>
+            </a:prstGeom>
+          </p:spPr>
+          <p:style>
+            <a:lnRef idx="2">
+              <a:schemeClr val="accent6"/>
+            </a:lnRef>
+            <a:fillRef idx="1">
+              <a:schemeClr val="lt1"/>
+            </a:fillRef>
+            <a:effectRef idx="0">
+              <a:schemeClr val="accent6"/>
+            </a:effectRef>
+            <a:fontRef idx="minor">
+              <a:schemeClr val="dk1"/>
+            </a:fontRef>
+          </p:style>
+          <p:txBody>
+            <a:bodyPr rtlCol="0" anchor="ctr"/>
+            <a:lstStyle/>
+            <a:p>
+              <a:pPr algn="ctr"/>
+              <a:endParaRPr lang="ko-KR" altLang="en-US"/>
+            </a:p>
+          </p:txBody>
+        </p:sp>
+        <p:sp>
+          <p:nvSpPr>
+            <p:cNvPr id="3" name="Rectangle 2"/>
+            <p:cNvSpPr/>
+            <p:nvPr/>
+          </p:nvSpPr>
+          <p:spPr>
+            <a:xfrm>
+              <a:off x="5009713" y="1990915"/>
+              <a:ext cx="2233534" cy="464695"/>
+            </a:xfrm>
+            <a:prstGeom prst="rect">
+              <a:avLst/>
+            </a:prstGeom>
+          </p:spPr>
+          <p:style>
+            <a:lnRef idx="2">
+              <a:schemeClr val="accent1">
+                <a:shade val="50000"/>
+              </a:schemeClr>
+            </a:lnRef>
+            <a:fillRef idx="1">
+              <a:schemeClr val="accent1"/>
+            </a:fillRef>
+            <a:effectRef idx="0">
+              <a:schemeClr val="accent1"/>
+            </a:effectRef>
+            <a:fontRef idx="minor">
+              <a:schemeClr val="lt1"/>
+            </a:fontRef>
+          </p:style>
+          <p:txBody>
+            <a:bodyPr rtlCol="0" anchor="ctr"/>
+            <a:lstStyle/>
+            <a:p>
+              <a:pPr algn="ctr"/>
+              <a:r>
+                <a:rPr lang="en-US" altLang="ko-KR" dirty="0" err="1" smtClean="0"/>
+                <a:t>emac_module_init</a:t>
+              </a:r>
+              <a:endParaRPr lang="ko-KR" altLang="en-US" dirty="0"/>
+            </a:p>
+          </p:txBody>
+        </p:sp>
+        <p:sp>
+          <p:nvSpPr>
+            <p:cNvPr id="4" name="Rectangle 3"/>
+            <p:cNvSpPr/>
+            <p:nvPr/>
+          </p:nvSpPr>
+          <p:spPr>
+            <a:xfrm>
+              <a:off x="5009713" y="5700937"/>
+              <a:ext cx="2233534" cy="464695"/>
+            </a:xfrm>
+            <a:prstGeom prst="rect">
+              <a:avLst/>
+            </a:prstGeom>
+          </p:spPr>
+          <p:style>
+            <a:lnRef idx="2">
+              <a:schemeClr val="accent1">
+                <a:shade val="50000"/>
+              </a:schemeClr>
+            </a:lnRef>
+            <a:fillRef idx="1">
+              <a:schemeClr val="accent1"/>
+            </a:fillRef>
+            <a:effectRef idx="0">
+              <a:schemeClr val="accent1"/>
+            </a:effectRef>
+            <a:fontRef idx="minor">
+              <a:schemeClr val="lt1"/>
+            </a:fontRef>
+          </p:style>
+          <p:txBody>
+            <a:bodyPr rtlCol="0" anchor="ctr"/>
+            <a:lstStyle/>
+            <a:p>
+              <a:pPr algn="ctr"/>
+              <a:r>
+                <a:rPr lang="en-US" altLang="ko-KR" dirty="0" err="1" smtClean="0"/>
+                <a:t>emac_module_exit</a:t>
+              </a:r>
+              <a:endParaRPr lang="ko-KR" altLang="en-US" dirty="0"/>
+            </a:p>
+          </p:txBody>
+        </p:sp>
+        <p:sp>
+          <p:nvSpPr>
+            <p:cNvPr id="5" name="Rectangle 4"/>
+            <p:cNvSpPr/>
+            <p:nvPr/>
+          </p:nvSpPr>
+          <p:spPr>
+            <a:xfrm>
+              <a:off x="5009713" y="2709163"/>
+              <a:ext cx="2233534" cy="464695"/>
+            </a:xfrm>
+            <a:prstGeom prst="rect">
+              <a:avLst/>
+            </a:prstGeom>
+          </p:spPr>
+          <p:style>
+            <a:lnRef idx="2">
+              <a:schemeClr val="accent1">
+                <a:shade val="50000"/>
+              </a:schemeClr>
+            </a:lnRef>
+            <a:fillRef idx="1">
+              <a:schemeClr val="accent1"/>
+            </a:fillRef>
+            <a:effectRef idx="0">
+              <a:schemeClr val="accent1"/>
+            </a:effectRef>
+            <a:fontRef idx="minor">
+              <a:schemeClr val="lt1"/>
+            </a:fontRef>
+          </p:style>
+          <p:txBody>
+            <a:bodyPr rtlCol="0" anchor="ctr"/>
+            <a:lstStyle/>
+            <a:p>
+              <a:pPr algn="ctr"/>
+              <a:r>
+                <a:rPr lang="en-US" altLang="ko-KR" dirty="0" err="1" smtClean="0"/>
+                <a:t>emac_open</a:t>
+              </a:r>
+              <a:endParaRPr lang="ko-KR" altLang="en-US" dirty="0"/>
+            </a:p>
+          </p:txBody>
+        </p:sp>
+        <p:sp>
+          <p:nvSpPr>
+            <p:cNvPr id="6" name="Rectangle 5"/>
+            <p:cNvSpPr/>
+            <p:nvPr/>
+          </p:nvSpPr>
+          <p:spPr>
+            <a:xfrm>
+              <a:off x="5009713" y="4982689"/>
+              <a:ext cx="2233534" cy="464695"/>
+            </a:xfrm>
+            <a:prstGeom prst="rect">
+              <a:avLst/>
+            </a:prstGeom>
+          </p:spPr>
+          <p:style>
+            <a:lnRef idx="2">
+              <a:schemeClr val="accent1">
+                <a:shade val="50000"/>
+              </a:schemeClr>
+            </a:lnRef>
+            <a:fillRef idx="1">
+              <a:schemeClr val="accent1"/>
+            </a:fillRef>
+            <a:effectRef idx="0">
+              <a:schemeClr val="accent1"/>
+            </a:effectRef>
+            <a:fontRef idx="minor">
+              <a:schemeClr val="lt1"/>
+            </a:fontRef>
+          </p:style>
+          <p:txBody>
+            <a:bodyPr rtlCol="0" anchor="ctr"/>
+            <a:lstStyle/>
+            <a:p>
+              <a:pPr algn="ctr"/>
+              <a:r>
+                <a:rPr lang="en-US" altLang="ko-KR" dirty="0" err="1" smtClean="0"/>
+                <a:t>emac_stop</a:t>
+              </a:r>
+              <a:endParaRPr lang="ko-KR" altLang="en-US" dirty="0"/>
+            </a:p>
+          </p:txBody>
+        </p:sp>
+        <p:sp>
+          <p:nvSpPr>
+            <p:cNvPr id="7" name="Rectangle 6"/>
+            <p:cNvSpPr/>
+            <p:nvPr/>
+          </p:nvSpPr>
+          <p:spPr>
+            <a:xfrm>
+              <a:off x="6422787" y="3845926"/>
+              <a:ext cx="2233534" cy="464695"/>
+            </a:xfrm>
+            <a:prstGeom prst="rect">
+              <a:avLst/>
+            </a:prstGeom>
+          </p:spPr>
+          <p:style>
+            <a:lnRef idx="2">
+              <a:schemeClr val="accent2">
+                <a:shade val="50000"/>
+              </a:schemeClr>
+            </a:lnRef>
+            <a:fillRef idx="1">
+              <a:schemeClr val="accent2"/>
+            </a:fillRef>
+            <a:effectRef idx="0">
+              <a:schemeClr val="accent2"/>
+            </a:effectRef>
+            <a:fontRef idx="minor">
+              <a:schemeClr val="lt1"/>
+            </a:fontRef>
+          </p:style>
+          <p:txBody>
+            <a:bodyPr rtlCol="0" anchor="ctr"/>
+            <a:lstStyle/>
+            <a:p>
+              <a:pPr algn="ctr"/>
+              <a:r>
+                <a:rPr lang="en-US" altLang="ko-KR" dirty="0" err="1" smtClean="0"/>
+                <a:t>emac_rx</a:t>
+              </a:r>
+              <a:endParaRPr lang="ko-KR" altLang="en-US" dirty="0"/>
+            </a:p>
+          </p:txBody>
+        </p:sp>
+        <p:sp>
+          <p:nvSpPr>
+            <p:cNvPr id="8" name="Rectangle 7"/>
+            <p:cNvSpPr/>
+            <p:nvPr/>
+          </p:nvSpPr>
+          <p:spPr>
+            <a:xfrm>
+              <a:off x="3623624" y="3845926"/>
+              <a:ext cx="2233534" cy="464695"/>
+            </a:xfrm>
+            <a:prstGeom prst="rect">
+              <a:avLst/>
+            </a:prstGeom>
+          </p:spPr>
+          <p:style>
+            <a:lnRef idx="2">
+              <a:schemeClr val="accent2">
+                <a:shade val="50000"/>
+              </a:schemeClr>
+            </a:lnRef>
+            <a:fillRef idx="1">
+              <a:schemeClr val="accent2"/>
+            </a:fillRef>
+            <a:effectRef idx="0">
+              <a:schemeClr val="accent2"/>
+            </a:effectRef>
+            <a:fontRef idx="minor">
+              <a:schemeClr val="lt1"/>
+            </a:fontRef>
+          </p:style>
+          <p:txBody>
+            <a:bodyPr rtlCol="0" anchor="ctr"/>
+            <a:lstStyle/>
+            <a:p>
+              <a:pPr algn="ctr"/>
+              <a:r>
+                <a:rPr lang="en-US" altLang="ko-KR" dirty="0" err="1" smtClean="0"/>
+                <a:t>emac_tx</a:t>
+              </a:r>
+              <a:endParaRPr lang="ko-KR" altLang="en-US" dirty="0"/>
+            </a:p>
+          </p:txBody>
+        </p:sp>
+        <p:cxnSp>
+          <p:nvCxnSpPr>
+            <p:cNvPr id="10" name="Straight Arrow Connector 9"/>
+            <p:cNvCxnSpPr>
+              <a:stCxn id="3" idx="2"/>
+              <a:endCxn id="5" idx="0"/>
+            </p:cNvCxnSpPr>
+            <p:nvPr/>
+          </p:nvCxnSpPr>
+          <p:spPr>
+            <a:xfrm>
+              <a:off x="6126480" y="2455610"/>
+              <a:ext cx="0" cy="253553"/>
+            </a:xfrm>
+            <a:prstGeom prst="straightConnector1">
+              <a:avLst/>
+            </a:prstGeom>
+            <a:ln>
+              <a:tailEnd type="triangle"/>
+            </a:ln>
+          </p:spPr>
+          <p:style>
+            <a:lnRef idx="2">
+              <a:schemeClr val="dk1"/>
+            </a:lnRef>
+            <a:fillRef idx="0">
+              <a:schemeClr val="dk1"/>
+            </a:fillRef>
+            <a:effectRef idx="1">
+              <a:schemeClr val="dk1"/>
+            </a:effectRef>
+            <a:fontRef idx="minor">
+              <a:schemeClr val="tx1"/>
+            </a:fontRef>
+          </p:style>
+        </p:cxnSp>
+        <p:cxnSp>
+          <p:nvCxnSpPr>
+            <p:cNvPr id="12" name="Straight Arrow Connector 11"/>
+            <p:cNvCxnSpPr>
+              <a:stCxn id="6" idx="2"/>
+              <a:endCxn id="4" idx="0"/>
+            </p:cNvCxnSpPr>
+            <p:nvPr/>
+          </p:nvCxnSpPr>
+          <p:spPr>
+            <a:xfrm>
+              <a:off x="6126480" y="5447384"/>
+              <a:ext cx="0" cy="253553"/>
+            </a:xfrm>
+            <a:prstGeom prst="straightConnector1">
+              <a:avLst/>
+            </a:prstGeom>
+            <a:ln>
+              <a:tailEnd type="triangle"/>
+            </a:ln>
+          </p:spPr>
+          <p:style>
+            <a:lnRef idx="2">
+              <a:schemeClr val="dk1"/>
+            </a:lnRef>
+            <a:fillRef idx="0">
+              <a:schemeClr val="dk1"/>
+            </a:fillRef>
+            <a:effectRef idx="1">
+              <a:schemeClr val="dk1"/>
+            </a:effectRef>
+            <a:fontRef idx="minor">
+              <a:schemeClr val="tx1"/>
+            </a:fontRef>
+          </p:style>
+        </p:cxnSp>
+        <p:cxnSp>
+          <p:nvCxnSpPr>
+            <p:cNvPr id="15" name="Straight Arrow Connector 14"/>
+            <p:cNvCxnSpPr>
+              <a:stCxn id="5" idx="2"/>
+              <a:endCxn id="13" idx="0"/>
+            </p:cNvCxnSpPr>
+            <p:nvPr/>
+          </p:nvCxnSpPr>
+          <p:spPr>
+            <a:xfrm>
+              <a:off x="6126480" y="3173858"/>
+              <a:ext cx="0" cy="360968"/>
+            </a:xfrm>
+            <a:prstGeom prst="straightConnector1">
+              <a:avLst/>
+            </a:prstGeom>
+            <a:ln>
+              <a:tailEnd type="triangle"/>
+            </a:ln>
+          </p:spPr>
+          <p:style>
+            <a:lnRef idx="2">
+              <a:schemeClr val="dk1"/>
+            </a:lnRef>
+            <a:fillRef idx="0">
+              <a:schemeClr val="dk1"/>
+            </a:fillRef>
+            <a:effectRef idx="1">
+              <a:schemeClr val="dk1"/>
+            </a:effectRef>
+            <a:fontRef idx="minor">
+              <a:schemeClr val="tx1"/>
+            </a:fontRef>
+          </p:style>
+        </p:cxnSp>
+        <p:cxnSp>
+          <p:nvCxnSpPr>
+            <p:cNvPr id="19" name="Straight Arrow Connector 18"/>
+            <p:cNvCxnSpPr>
+              <a:stCxn id="13" idx="2"/>
+              <a:endCxn id="6" idx="0"/>
+            </p:cNvCxnSpPr>
+            <p:nvPr/>
+          </p:nvCxnSpPr>
+          <p:spPr>
+            <a:xfrm>
+              <a:off x="6126480" y="4613297"/>
+              <a:ext cx="0" cy="369392"/>
+            </a:xfrm>
+            <a:prstGeom prst="straightConnector1">
+              <a:avLst/>
+            </a:prstGeom>
+            <a:ln>
+              <a:tailEnd type="triangle"/>
+            </a:ln>
+          </p:spPr>
+          <p:style>
+            <a:lnRef idx="2">
+              <a:schemeClr val="dk1"/>
+            </a:lnRef>
+            <a:fillRef idx="0">
+              <a:schemeClr val="dk1"/>
+            </a:fillRef>
+            <a:effectRef idx="1">
+              <a:schemeClr val="dk1"/>
+            </a:effectRef>
+            <a:fontRef idx="minor">
+              <a:schemeClr val="tx1"/>
+            </a:fontRef>
+          </p:style>
+        </p:cxnSp>
+      </p:grpSp>
     </p:spTree>
     <p:extLst>
       <p:ext uri="{BB962C8B-B14F-4D97-AF65-F5344CB8AC3E}">
@@ -3931,7 +5212,7 @@
           <a:p>
             <a:r>
               <a:rPr lang="en-US" altLang="ko-KR" dirty="0" smtClean="0"/>
-              <a:t>Functions</a:t>
+              <a:t>Registers in Use</a:t>
             </a:r>
             <a:endParaRPr lang="ko-KR" altLang="en-US" sz="2800" dirty="0"/>
           </a:p>
@@ -3959,21 +5240,97 @@
               <a:buChar char="•"/>
             </a:pPr>
             <a:r>
-              <a:rPr lang="en-US" altLang="ko-KR" dirty="0" smtClean="0"/>
+              <a:rPr lang="en-US" altLang="ko-KR" dirty="0"/>
               <a:t> </a:t>
             </a:r>
             <a:r>
-              <a:rPr lang="en-US" altLang="ko-KR" dirty="0" err="1" smtClean="0"/>
-              <a:t>emac_open</a:t>
-            </a:r>
-            <a:endParaRPr lang="en-US" altLang="ko-KR" dirty="0" smtClean="0"/>
+              <a:rPr lang="en-US" altLang="ko-KR" b="1" dirty="0" smtClean="0"/>
+              <a:t>Global Register Bank (GRB) </a:t>
+            </a:r>
+            <a:r>
+              <a:rPr lang="en-US" altLang="ko-KR" dirty="0" smtClean="0"/>
+              <a:t>: register located inside </a:t>
+            </a:r>
+            <a:r>
+              <a:rPr lang="en-US" altLang="ko-KR" b="1" dirty="0" smtClean="0"/>
+              <a:t>FPGA</a:t>
+            </a:r>
+            <a:endParaRPr lang="en-US" altLang="ko-KR" b="1" dirty="0" smtClean="0"/>
+          </a:p>
+        </p:txBody>
+      </p:sp>
+      <p:pic>
+        <p:nvPicPr>
+          <p:cNvPr id="4" name="Picture 3"/>
+          <p:cNvPicPr>
+            <a:picLocks noChangeAspect="1"/>
+          </p:cNvPicPr>
+          <p:nvPr/>
+        </p:nvPicPr>
+        <p:blipFill>
+          <a:blip r:embed="rId2"/>
+          <a:stretch>
+            <a:fillRect/>
+          </a:stretch>
+        </p:blipFill>
+        <p:spPr>
+          <a:xfrm>
+            <a:off x="3188872" y="2363203"/>
+            <a:ext cx="5173076" cy="3704178"/>
+          </a:xfrm>
+          <a:prstGeom prst="rect">
+            <a:avLst/>
+          </a:prstGeom>
+        </p:spPr>
+      </p:pic>
+      <p:sp>
+        <p:nvSpPr>
+          <p:cNvPr id="5" name="Oval 4"/>
+          <p:cNvSpPr/>
+          <p:nvPr/>
+        </p:nvSpPr>
+        <p:spPr>
+          <a:xfrm>
+            <a:off x="3801979" y="4006516"/>
+            <a:ext cx="745958" cy="709863"/>
+          </a:xfrm>
+          <a:prstGeom prst="ellipse">
+            <a:avLst/>
+          </a:prstGeom>
+          <a:noFill/>
+          <a:ln w="76200">
+            <a:solidFill>
+              <a:srgbClr val="FF0000"/>
+            </a:solidFill>
+          </a:ln>
+        </p:spPr>
+        <p:style>
+          <a:lnRef idx="2">
+            <a:schemeClr val="accent2"/>
+          </a:lnRef>
+          <a:fillRef idx="1">
+            <a:schemeClr val="lt1"/>
+          </a:fillRef>
+          <a:effectRef idx="0">
+            <a:schemeClr val="accent2"/>
+          </a:effectRef>
+          <a:fontRef idx="minor">
+            <a:schemeClr val="dk1"/>
+          </a:fontRef>
+        </p:style>
+        <p:txBody>
+          <a:bodyPr rtlCol="0" anchor="ctr"/>
+          <a:lstStyle/>
+          <a:p>
+            <a:pPr algn="ctr"/>
+            <a:endParaRPr lang="ko-KR" altLang="en-US"/>
           </a:p>
         </p:txBody>
       </p:sp>
     </p:spTree>
     <p:extLst>
       <p:ext uri="{BB962C8B-B14F-4D97-AF65-F5344CB8AC3E}">
-        <p14:creationId xmlns:p14="http://schemas.microsoft.com/office/powerpoint/2010/main" val="3278514229"/>
+        <p14:creationId xmlns:p14="http://schemas.microsoft.com/office/powerpoint/2010/main" val="2927611294"/>
       </p:ext>
     </p:extLst>
   </p:cSld>
@@ -4024,7 +5381,7 @@
           <a:p>
             <a:r>
               <a:rPr lang="en-US" altLang="ko-KR" dirty="0" smtClean="0"/>
-              <a:t>Questions</a:t>
+              <a:t>Registers in Use</a:t>
             </a:r>
             <a:endParaRPr lang="ko-KR" altLang="en-US" sz="2800" dirty="0"/>
           </a:p>
@@ -4052,8 +5409,20 @@
               <a:buChar char="•"/>
             </a:pPr>
             <a:r>
-              <a:rPr lang="en-US" altLang="ko-KR" dirty="0" smtClean="0"/>
-              <a:t> Line 142: Why check if core is 0?</a:t>
+              <a:rPr lang="en-US" altLang="ko-KR" dirty="0"/>
+              <a:t> </a:t>
+            </a:r>
+            <a:r>
+              <a:rPr lang="en-US" altLang="ko-KR" b="1" dirty="0" smtClean="0"/>
+              <a:t>Configuration Register Bank (CRB) </a:t>
+            </a:r>
+            <a:r>
+              <a:rPr lang="en-US" altLang="ko-KR" dirty="0" smtClean="0"/>
+              <a:t>: set of configuration registers for </a:t>
+            </a:r>
+            <a:r>
+              <a:rPr lang="en-US" altLang="ko-KR" b="1" dirty="0" smtClean="0"/>
+              <a:t>SCC cores</a:t>
             </a:r>
           </a:p>
           <a:p>
@@ -4063,37 +5432,426 @@
             </a:pPr>
             <a:r>
               <a:rPr lang="en-US" altLang="ko-KR" dirty="0" smtClean="0"/>
-              <a:t>Core is set in </a:t>
-            </a:r>
-            <a:r>
-              <a:rPr lang="en-US" altLang="ko-KR" i="1" dirty="0" err="1" smtClean="0"/>
-              <a:t>emac_module_init</a:t>
-            </a:r>
-            <a:r>
-              <a:rPr lang="en-US" altLang="ko-KR" dirty="0" smtClean="0"/>
-              <a:t>, line 1062</a:t>
-            </a:r>
-          </a:p>
+              <a:t>Control enabling local reset, core initialization &amp; configuration, core interrupt handling, and L2 cache configuration</a:t>
+            </a:r>
+            <a:endParaRPr lang="en-US" altLang="ko-KR" dirty="0"/>
+          </a:p>
+          <a:p>
+            <a:pPr lvl="1">
+              <a:buFont typeface="Arial" panose="020B0604020202020204" pitchFamily="34" charset="0"/>
+              <a:buChar char="•"/>
+            </a:pPr>
+            <a:r>
+              <a:rPr lang="en-US" altLang="ko-KR" dirty="0" smtClean="0"/>
+              <a:t>Each SCC core, L2 cache controller, and global clocking unit (GCU) has a dedicated </a:t>
+            </a:r>
+            <a:r>
+              <a:rPr lang="en-US" altLang="ko-KR" dirty="0" err="1" smtClean="0"/>
+              <a:t>config</a:t>
+            </a:r>
+            <a:r>
+              <a:rPr lang="en-US" altLang="ko-KR" dirty="0" smtClean="0"/>
+              <a:t> register</a:t>
+            </a:r>
+          </a:p>
+          <a:p>
+            <a:pPr lvl="1">
+              <a:buFont typeface="Arial" panose="020B0604020202020204" pitchFamily="34" charset="0"/>
+              <a:buChar char="•"/>
+            </a:pPr>
+            <a:r>
+              <a:rPr lang="en-US" altLang="ko-KR" dirty="0" smtClean="0"/>
+              <a:t>Writable by any core or the system interface unit</a:t>
+            </a:r>
+          </a:p>
+          <a:p>
+            <a:pPr lvl="1">
+              <a:buFont typeface="Arial" panose="020B0604020202020204" pitchFamily="34" charset="0"/>
+              <a:buChar char="•"/>
+            </a:pPr>
+            <a:r>
+              <a:rPr lang="en-US" altLang="ko-KR" dirty="0" smtClean="0"/>
+              <a:t>Byte-wise access not supported</a:t>
+            </a:r>
+          </a:p>
+          <a:p>
+            <a:pPr lvl="1">
+              <a:buFont typeface="Arial" panose="020B0604020202020204" pitchFamily="34" charset="0"/>
+              <a:buChar char="•"/>
+            </a:pPr>
+            <a:r>
+              <a:rPr lang="en-US" altLang="ko-KR" dirty="0" smtClean="0"/>
+              <a:t>Should perform read-modify-write on all 32 bits of a </a:t>
+            </a:r>
+            <a:r>
+              <a:rPr lang="en-US" altLang="ko-KR" dirty="0" err="1" smtClean="0"/>
+              <a:t>config</a:t>
+            </a:r>
+            <a:r>
+              <a:rPr lang="en-US" altLang="ko-KR" dirty="0" smtClean="0"/>
+              <a:t> register</a:t>
+            </a:r>
+            <a:endParaRPr lang="en-US" altLang="ko-KR" dirty="0" smtClean="0"/>
+          </a:p>
+        </p:txBody>
+      </p:sp>
+    </p:spTree>
+    <p:extLst>
+      <p:ext uri="{BB962C8B-B14F-4D97-AF65-F5344CB8AC3E}">
+        <p14:creationId xmlns:p14="http://schemas.microsoft.com/office/powerpoint/2010/main" val="2119502297"/>
+      </p:ext>
+    </p:extLst>
+  </p:cSld>
+  <p:clrMapOvr>
+    <a:masterClrMapping/>
+  </p:clrMapOvr>
+  <p:timing>
+    <p:tnLst>
+      <p:par>
+        <p:cTn id="1" dur="indefinite" restart="never" nodeType="tmRoot"/>
+      </p:par>
+    </p:tnLst>
+  </p:timing>
+</p:sld>
+</file>
+
+<file path=ppt/slides/slide5.xml><?xml version="1.0" encoding="utf-8"?>
+<p:sld xmlns:a="http://schemas.openxmlformats.org/drawingml/2006/main" xmlns:r="http://schemas.openxmlformats.org/officeDocument/2006/relationships" xmlns:p="http://schemas.openxmlformats.org/presentationml/2006/main">
+  <p:cSld>
+    <p:spTree>
+      <p:nvGrpSpPr>
+        <p:cNvPr id="1" name=""/>
+        <p:cNvGrpSpPr/>
+        <p:nvPr/>
+      </p:nvGrpSpPr>
+      <p:grpSpPr>
+        <a:xfrm>
+          <a:off x="0" y="0"/>
+          <a:ext cx="0" cy="0"/>
+          <a:chOff x="0" y="0"/>
+          <a:chExt cx="0" cy="0"/>
+        </a:xfrm>
+      </p:grpSpPr>
+      <p:sp>
+        <p:nvSpPr>
+          <p:cNvPr id="2" name="Title 1"/>
+          <p:cNvSpPr>
+            <a:spLocks noGrp="1"/>
+          </p:cNvSpPr>
+          <p:nvPr>
+            <p:ph type="title"/>
+          </p:nvPr>
+        </p:nvSpPr>
+        <p:spPr/>
+        <p:txBody>
+          <a:bodyPr/>
+          <a:lstStyle/>
+          <a:p>
+            <a:r>
+              <a:rPr lang="en-US" altLang="ko-KR" dirty="0" smtClean="0"/>
+              <a:t>Helper functions &amp; macros</a:t>
+            </a:r>
+            <a:endParaRPr lang="ko-KR" altLang="en-US" sz="2800" dirty="0"/>
+          </a:p>
+        </p:txBody>
+      </p:sp>
+      <p:sp>
+        <p:nvSpPr>
+          <p:cNvPr id="3" name="Content Placeholder 2"/>
+          <p:cNvSpPr>
+            <a:spLocks noGrp="1"/>
+          </p:cNvSpPr>
+          <p:nvPr>
+            <p:ph idx="1"/>
+          </p:nvPr>
+        </p:nvSpPr>
+        <p:spPr/>
+        <p:txBody>
+          <a:bodyPr>
+            <a:normAutofit fontScale="92500" lnSpcReduction="20000"/>
+          </a:bodyPr>
+          <a:lstStyle/>
           <a:p>
             <a:pPr>
               <a:buFont typeface="Arial" panose="020B0604020202020204" pitchFamily="34" charset="0"/>
               <a:buChar char="•"/>
             </a:pPr>
             <a:r>
+              <a:rPr lang="en-US" altLang="ko-KR" dirty="0" smtClean="0"/>
+              <a:t> </a:t>
+            </a:r>
+            <a:r>
+              <a:rPr lang="en-US" altLang="ko-KR" i="1" dirty="0" smtClean="0"/>
+              <a:t>static </a:t>
+            </a:r>
+            <a:r>
+              <a:rPr lang="en-US" altLang="ko-KR" i="1" dirty="0" err="1" smtClean="0"/>
+              <a:t>int</a:t>
+            </a:r>
+            <a:r>
+              <a:rPr lang="en-US" altLang="ko-KR" i="1" dirty="0" smtClean="0"/>
+              <a:t> </a:t>
+            </a:r>
+            <a:r>
+              <a:rPr lang="en-US" altLang="ko-KR" b="1" i="1" dirty="0" err="1" smtClean="0"/>
+              <a:t>emac_readl</a:t>
+            </a:r>
+            <a:r>
+              <a:rPr lang="en-US" altLang="ko-KR" i="1" dirty="0" smtClean="0"/>
+              <a:t> (void *</a:t>
+            </a:r>
+            <a:r>
+              <a:rPr lang="en-US" altLang="ko-KR" i="1" dirty="0" err="1" smtClean="0"/>
+              <a:t>addr</a:t>
+            </a:r>
+            <a:r>
+              <a:rPr lang="en-US" altLang="ko-KR" i="1" dirty="0" smtClean="0"/>
+              <a:t>)</a:t>
+            </a:r>
+            <a:endParaRPr lang="en-US" altLang="ko-KR" i="1" dirty="0"/>
+          </a:p>
+          <a:p>
+            <a:pPr lvl="1">
+              <a:buFont typeface="Arial" panose="020B0604020202020204" pitchFamily="34" charset="0"/>
+              <a:buChar char="•"/>
+            </a:pPr>
+            <a:r>
+              <a:rPr lang="en-US" altLang="ko-KR" dirty="0" smtClean="0"/>
+              <a:t>Read long from </a:t>
+            </a:r>
+            <a:r>
+              <a:rPr lang="en-US" altLang="ko-KR" dirty="0" err="1" smtClean="0"/>
+              <a:t>eMAC</a:t>
+            </a:r>
+            <a:r>
+              <a:rPr lang="en-US" altLang="ko-KR" dirty="0" smtClean="0"/>
+              <a:t> at </a:t>
+            </a:r>
+            <a:r>
+              <a:rPr lang="en-US" altLang="ko-KR" i="1" dirty="0" err="1" smtClean="0"/>
+              <a:t>addr</a:t>
+            </a:r>
+            <a:endParaRPr lang="en-US" altLang="ko-KR" i="1" dirty="0" smtClean="0"/>
+          </a:p>
+          <a:p>
+            <a:pPr lvl="1">
+              <a:buFont typeface="Arial" panose="020B0604020202020204" pitchFamily="34" charset="0"/>
+              <a:buChar char="•"/>
+            </a:pPr>
+            <a:r>
+              <a:rPr lang="en-US" altLang="ko-KR" dirty="0" smtClean="0"/>
+              <a:t>Implemented with 2 </a:t>
+            </a:r>
+            <a:r>
+              <a:rPr lang="en-US" altLang="ko-KR" i="1" dirty="0" err="1" smtClean="0"/>
+              <a:t>readl</a:t>
+            </a:r>
+            <a:r>
+              <a:rPr lang="en-US" altLang="ko-KR" dirty="0" smtClean="0"/>
+              <a:t> calls</a:t>
+            </a:r>
+          </a:p>
+          <a:p>
+            <a:pPr>
+              <a:buFont typeface="Arial" panose="020B0604020202020204" pitchFamily="34" charset="0"/>
+              <a:buChar char="•"/>
+            </a:pPr>
+            <a:r>
               <a:rPr lang="en-US" altLang="ko-KR" dirty="0"/>
               <a:t> </a:t>
             </a:r>
             <a:r>
-              <a:rPr lang="en-US" altLang="ko-KR" dirty="0" smtClean="0"/>
-              <a:t>Line 164: Why set </a:t>
+              <a:rPr lang="en-US" altLang="ko-KR" i="1" dirty="0" smtClean="0"/>
+              <a:t>static void </a:t>
+            </a:r>
+            <a:r>
+              <a:rPr lang="en-US" altLang="ko-KR" b="1" i="1" dirty="0" err="1" smtClean="0"/>
+              <a:t>emac_writel</a:t>
+            </a:r>
+            <a:r>
+              <a:rPr lang="en-US" altLang="ko-KR" i="1" dirty="0" smtClean="0"/>
+              <a:t> (</a:t>
             </a:r>
             <a:r>
               <a:rPr lang="en-US" altLang="ko-KR" i="1" dirty="0" err="1" smtClean="0"/>
-              <a:t>transmitter_addr</a:t>
-            </a:r>
-            <a:r>
-              <a:rPr lang="en-US" altLang="ko-KR" dirty="0" smtClean="0"/>
-              <a:t> when it was already set in line 139?</a:t>
+              <a:t>int</a:t>
+            </a:r>
+            <a:r>
+              <a:rPr lang="en-US" altLang="ko-KR" i="1" dirty="0" smtClean="0"/>
+              <a:t> value, void *</a:t>
+            </a:r>
+            <a:r>
+              <a:rPr lang="en-US" altLang="ko-KR" i="1" dirty="0" err="1" smtClean="0"/>
+              <a:t>addr</a:t>
+            </a:r>
+            <a:r>
+              <a:rPr lang="en-US" altLang="ko-KR" i="1" dirty="0" smtClean="0"/>
+              <a:t>)</a:t>
+            </a:r>
+            <a:endParaRPr lang="en-US" altLang="ko-KR" i="1" dirty="0" smtClean="0"/>
+          </a:p>
+          <a:p>
+            <a:pPr lvl="1">
+              <a:buFont typeface="Arial" panose="020B0604020202020204" pitchFamily="34" charset="0"/>
+              <a:buChar char="•"/>
+            </a:pPr>
+            <a:r>
+              <a:rPr lang="en-US" altLang="ko-KR" dirty="0" smtClean="0"/>
+              <a:t>Write long </a:t>
+            </a:r>
+            <a:r>
+              <a:rPr lang="en-US" altLang="ko-KR" i="1" dirty="0" smtClean="0"/>
+              <a:t>value</a:t>
+            </a:r>
+            <a:r>
+              <a:rPr lang="en-US" altLang="ko-KR" dirty="0" smtClean="0"/>
+              <a:t> to </a:t>
+            </a:r>
+            <a:r>
+              <a:rPr lang="en-US" altLang="ko-KR" dirty="0" err="1" smtClean="0"/>
+              <a:t>eMAC</a:t>
+            </a:r>
+            <a:r>
+              <a:rPr lang="en-US" altLang="ko-KR" dirty="0" smtClean="0"/>
+              <a:t> at </a:t>
+            </a:r>
+            <a:r>
+              <a:rPr lang="en-US" altLang="ko-KR" i="1" dirty="0" err="1" smtClean="0"/>
+              <a:t>addr</a:t>
+            </a:r>
+            <a:endParaRPr lang="en-US" altLang="ko-KR" i="1" dirty="0" smtClean="0"/>
+          </a:p>
+          <a:p>
+            <a:pPr lvl="1">
+              <a:buFont typeface="Arial" panose="020B0604020202020204" pitchFamily="34" charset="0"/>
+              <a:buChar char="•"/>
+            </a:pPr>
+            <a:r>
+              <a:rPr lang="en-US" altLang="ko-KR" dirty="0" smtClean="0"/>
+              <a:t>Implemented with </a:t>
+            </a:r>
+            <a:r>
+              <a:rPr lang="en-US" altLang="ko-KR" i="1" dirty="0" err="1" smtClean="0"/>
+              <a:t>writel</a:t>
+            </a:r>
+            <a:endParaRPr lang="en-US" altLang="ko-KR" i="1" dirty="0" smtClean="0"/>
+          </a:p>
+          <a:p>
+            <a:pPr>
+              <a:buFont typeface="Arial" panose="020B0604020202020204" pitchFamily="34" charset="0"/>
+              <a:buChar char="•"/>
+            </a:pPr>
+            <a:r>
+              <a:rPr lang="en-US" altLang="ko-KR" dirty="0"/>
+              <a:t> </a:t>
+            </a:r>
+            <a:r>
+              <a:rPr lang="en-US" altLang="ko-KR" b="1" i="1" dirty="0" smtClean="0"/>
+              <a:t>RA</a:t>
+            </a:r>
+            <a:r>
+              <a:rPr lang="en-US" altLang="ko-KR" i="1" dirty="0" smtClean="0"/>
+              <a:t>(_x, _y)</a:t>
+            </a:r>
+          </a:p>
+          <a:p>
+            <a:pPr lvl="1">
+              <a:buFont typeface="Arial" panose="020B0604020202020204" pitchFamily="34" charset="0"/>
+              <a:buChar char="•"/>
+            </a:pPr>
+            <a:r>
+              <a:rPr lang="en-US" altLang="ko-KR" dirty="0" smtClean="0"/>
+              <a:t>GRB address + (</a:t>
+            </a:r>
+            <a:r>
+              <a:rPr lang="en-US" altLang="ko-KR" i="1" dirty="0" smtClean="0"/>
+              <a:t>_x</a:t>
+            </a:r>
+            <a:r>
+              <a:rPr lang="en-US" altLang="ko-KR" dirty="0" smtClean="0"/>
+              <a:t>)+ (</a:t>
+            </a:r>
+            <a:r>
+              <a:rPr lang="en-US" altLang="ko-KR" i="1" dirty="0" smtClean="0"/>
+              <a:t>_y</a:t>
+            </a:r>
+            <a:r>
+              <a:rPr lang="en-US" altLang="ko-KR" dirty="0" smtClean="0"/>
+              <a:t> * 4)</a:t>
+            </a:r>
+          </a:p>
+          <a:p>
+            <a:pPr>
+              <a:buFont typeface="Arial" panose="020B0604020202020204" pitchFamily="34" charset="0"/>
+              <a:buChar char="•"/>
+            </a:pPr>
+            <a:r>
+              <a:rPr lang="en-US" altLang="ko-KR" dirty="0" smtClean="0"/>
+              <a:t> </a:t>
+            </a:r>
+            <a:r>
+              <a:rPr lang="en-US" altLang="ko-KR" b="1" i="1" dirty="0" smtClean="0"/>
+              <a:t>RA_CRB</a:t>
+            </a:r>
+            <a:r>
+              <a:rPr lang="en-US" altLang="ko-KR" i="1" dirty="0" smtClean="0"/>
+              <a:t>(_x)</a:t>
+            </a:r>
+          </a:p>
+          <a:p>
+            <a:pPr lvl="1">
+              <a:buFont typeface="Arial" panose="020B0604020202020204" pitchFamily="34" charset="0"/>
+              <a:buChar char="•"/>
+            </a:pPr>
+            <a:r>
+              <a:rPr lang="en-US" altLang="ko-KR" dirty="0" smtClean="0"/>
+              <a:t>CRB address + (</a:t>
+            </a:r>
+            <a:r>
+              <a:rPr lang="en-US" altLang="ko-KR" i="1" dirty="0" smtClean="0"/>
+              <a:t>_x</a:t>
+            </a:r>
+            <a:r>
+              <a:rPr lang="en-US" altLang="ko-KR" dirty="0" smtClean="0"/>
+              <a:t>)</a:t>
+            </a:r>
+          </a:p>
+          <a:p>
+            <a:pPr>
+              <a:buFont typeface="Arial" panose="020B0604020202020204" pitchFamily="34" charset="0"/>
+              <a:buChar char="•"/>
+            </a:pPr>
+            <a:r>
+              <a:rPr lang="en-US" altLang="ko-KR" dirty="0"/>
+              <a:t> </a:t>
+            </a:r>
+            <a:r>
+              <a:rPr lang="en-US" altLang="ko-KR" dirty="0" smtClean="0"/>
+              <a:t>All accesses to the registers are done via these macros</a:t>
+            </a:r>
+          </a:p>
+          <a:p>
+            <a:pPr>
+              <a:buFont typeface="Arial" panose="020B0604020202020204" pitchFamily="34" charset="0"/>
+              <a:buChar char="•"/>
+            </a:pPr>
+            <a:r>
+              <a:rPr lang="en-US" altLang="ko-KR" dirty="0"/>
+              <a:t> </a:t>
+            </a:r>
+            <a:r>
+              <a:rPr lang="en-US" altLang="ko-KR" dirty="0" smtClean="0"/>
+              <a:t>Both polling and interrupts can be implemented</a:t>
+            </a:r>
+          </a:p>
+          <a:p>
+            <a:pPr lvl="1">
+              <a:buFont typeface="Arial" panose="020B0604020202020204" pitchFamily="34" charset="0"/>
+              <a:buChar char="•"/>
+            </a:pPr>
+            <a:r>
+              <a:rPr lang="en-US" altLang="ko-KR" dirty="0" smtClean="0"/>
+              <a:t>Will suppose using interrupt</a:t>
             </a:r>
             <a:endParaRPr lang="en-US" altLang="ko-KR" dirty="0" smtClean="0"/>
           </a:p>
@@ -4102,7 +5860,892 @@
     </p:spTree>
     <p:extLst>
       <p:ext uri="{BB962C8B-B14F-4D97-AF65-F5344CB8AC3E}">
-        <p14:creationId xmlns:p14="http://schemas.microsoft.com/office/powerpoint/2010/main" val="2178757897"/>
+        <p14:creationId xmlns:p14="http://schemas.microsoft.com/office/powerpoint/2010/main" val="1870398410"/>
+      </p:ext>
+    </p:extLst>
+  </p:cSld>
+  <p:clrMapOvr>
+    <a:masterClrMapping/>
+  </p:clrMapOvr>
+  <p:timing>
+    <p:tnLst>
+      <p:par>
+        <p:cTn id="1" dur="indefinite" restart="never" nodeType="tmRoot"/>
+      </p:par>
+    </p:tnLst>
+  </p:timing>
+</p:sld>
+</file>
+
+<file path=ppt/slides/slide6.xml><?xml version="1.0" encoding="utf-8"?>
+<p:sld xmlns:a="http://schemas.openxmlformats.org/drawingml/2006/main" xmlns:r="http://schemas.openxmlformats.org/officeDocument/2006/relationships" xmlns:p="http://schemas.openxmlformats.org/presentationml/2006/main">
+  <p:cSld>
+    <p:spTree>
+      <p:nvGrpSpPr>
+        <p:cNvPr id="1" name=""/>
+        <p:cNvGrpSpPr/>
+        <p:nvPr/>
+      </p:nvGrpSpPr>
+      <p:grpSpPr>
+        <a:xfrm>
+          <a:off x="0" y="0"/>
+          <a:ext cx="0" cy="0"/>
+          <a:chOff x="0" y="0"/>
+          <a:chExt cx="0" cy="0"/>
+        </a:xfrm>
+      </p:grpSpPr>
+      <p:sp>
+        <p:nvSpPr>
+          <p:cNvPr id="2" name="Title 1"/>
+          <p:cNvSpPr>
+            <a:spLocks noGrp="1"/>
+          </p:cNvSpPr>
+          <p:nvPr>
+            <p:ph type="title"/>
+          </p:nvPr>
+        </p:nvSpPr>
+        <p:spPr/>
+        <p:txBody>
+          <a:bodyPr/>
+          <a:lstStyle/>
+          <a:p>
+            <a:r>
+              <a:rPr lang="en-US" altLang="ko-KR" dirty="0" err="1" smtClean="0"/>
+              <a:t>emac_module_init</a:t>
+            </a:r>
+            <a:endParaRPr lang="ko-KR" altLang="en-US" sz="2800" dirty="0"/>
+          </a:p>
+        </p:txBody>
+      </p:sp>
+      <p:sp>
+        <p:nvSpPr>
+          <p:cNvPr id="3" name="Content Placeholder 2"/>
+          <p:cNvSpPr>
+            <a:spLocks noGrp="1"/>
+          </p:cNvSpPr>
+          <p:nvPr>
+            <p:ph idx="1"/>
+          </p:nvPr>
+        </p:nvSpPr>
+        <p:spPr/>
+        <p:txBody>
+          <a:bodyPr>
+            <a:normAutofit fontScale="92500" lnSpcReduction="20000"/>
+          </a:bodyPr>
+          <a:lstStyle/>
+          <a:p>
+            <a:pPr marL="457200" indent="-457200">
+              <a:buFont typeface="+mj-lt"/>
+              <a:buAutoNum type="arabicPeriod"/>
+            </a:pPr>
+            <a:r>
+              <a:rPr lang="en-US" altLang="ko-KR" dirty="0" smtClean="0"/>
+              <a:t>Map GRB to 0xF9000000 with size 0x10000</a:t>
+            </a:r>
+          </a:p>
+          <a:p>
+            <a:pPr marL="457200" indent="-457200">
+              <a:buFont typeface="+mj-lt"/>
+              <a:buAutoNum type="arabicPeriod"/>
+            </a:pPr>
+            <a:r>
+              <a:rPr lang="en-US" altLang="ko-KR" dirty="0" smtClean="0"/>
+              <a:t>Map CRB to 0xF8000000 with size 2 * (page size)</a:t>
+            </a:r>
+          </a:p>
+          <a:p>
+            <a:pPr marL="457200" indent="-457200">
+              <a:buFont typeface="+mj-lt"/>
+              <a:buAutoNum type="arabicPeriod"/>
+            </a:pPr>
+            <a:r>
+              <a:rPr lang="en-US" altLang="ko-KR" dirty="0" smtClean="0"/>
+              <a:t>Read tile ID from (CRB + 0x0100) and determine core position</a:t>
+            </a:r>
+          </a:p>
+          <a:p>
+            <a:pPr lvl="1">
+              <a:buFont typeface="Arial" panose="020B0604020202020204" pitchFamily="34" charset="0"/>
+              <a:buChar char="•"/>
+            </a:pPr>
+            <a:r>
+              <a:rPr lang="en-US" altLang="ko-KR" dirty="0" smtClean="0"/>
+              <a:t>Bits 06:03 – x</a:t>
+            </a:r>
+          </a:p>
+          <a:p>
+            <a:pPr lvl="1">
+              <a:buFont typeface="Arial" panose="020B0604020202020204" pitchFamily="34" charset="0"/>
+              <a:buChar char="•"/>
+            </a:pPr>
+            <a:r>
+              <a:rPr lang="en-US" altLang="ko-KR" dirty="0" smtClean="0"/>
+              <a:t>Bits 10:07 – y</a:t>
+            </a:r>
+          </a:p>
+          <a:p>
+            <a:pPr lvl="1">
+              <a:buFont typeface="Arial" panose="020B0604020202020204" pitchFamily="34" charset="0"/>
+              <a:buChar char="•"/>
+            </a:pPr>
+            <a:r>
+              <a:rPr lang="en-US" altLang="ko-KR" dirty="0" smtClean="0"/>
+              <a:t>Bits 02:00 – z</a:t>
+            </a:r>
+            <a:endParaRPr lang="en-US" altLang="ko-KR" dirty="0" smtClean="0"/>
+          </a:p>
+          <a:p>
+            <a:pPr marL="457200" indent="-457200">
+              <a:buFont typeface="+mj-lt"/>
+              <a:buAutoNum type="arabicPeriod"/>
+            </a:pPr>
+            <a:r>
+              <a:rPr lang="en-US" altLang="ko-KR" dirty="0" smtClean="0"/>
+              <a:t>Set core number</a:t>
+            </a:r>
+          </a:p>
+          <a:p>
+            <a:pPr marL="457200" indent="-457200">
+              <a:buFont typeface="+mj-lt"/>
+              <a:buAutoNum type="arabicPeriod"/>
+            </a:pPr>
+            <a:r>
+              <a:rPr lang="en-US" altLang="ko-KR" dirty="0" smtClean="0"/>
+              <a:t>Get FPGA/</a:t>
+            </a:r>
+            <a:r>
+              <a:rPr lang="en-US" altLang="ko-KR" dirty="0" err="1" smtClean="0"/>
+              <a:t>sccKit</a:t>
+            </a:r>
+            <a:r>
+              <a:rPr lang="en-US" altLang="ko-KR" dirty="0" smtClean="0"/>
+              <a:t> port settings from (GRB + 0x822C)</a:t>
+            </a:r>
+          </a:p>
+          <a:p>
+            <a:pPr marL="457200" indent="-457200">
+              <a:buFont typeface="+mj-lt"/>
+              <a:buAutoNum type="arabicPeriod"/>
+            </a:pPr>
+            <a:r>
+              <a:rPr lang="en-US" altLang="ko-KR" dirty="0" smtClean="0"/>
+              <a:t>Create </a:t>
+            </a:r>
+            <a:r>
+              <a:rPr lang="en-US" altLang="ko-KR" dirty="0" err="1" smtClean="0"/>
+              <a:t>eMAC</a:t>
+            </a:r>
+            <a:r>
+              <a:rPr lang="en-US" altLang="ko-KR" dirty="0" smtClean="0"/>
+              <a:t> interface (</a:t>
+            </a:r>
+            <a:r>
+              <a:rPr lang="en-US" altLang="ko-KR" i="1" dirty="0" smtClean="0"/>
+              <a:t>emac0</a:t>
+            </a:r>
+            <a:r>
+              <a:rPr lang="en-US" altLang="ko-KR" dirty="0" smtClean="0"/>
+              <a:t>, …)</a:t>
+            </a:r>
+          </a:p>
+          <a:p>
+            <a:pPr lvl="1">
+              <a:buFont typeface="Arial" panose="020B0604020202020204" pitchFamily="34" charset="0"/>
+              <a:buChar char="•"/>
+            </a:pPr>
+            <a:r>
+              <a:rPr lang="en-US" altLang="ko-KR" dirty="0" err="1" smtClean="0"/>
+              <a:t>Initilize</a:t>
+            </a:r>
+            <a:r>
+              <a:rPr lang="en-US" altLang="ko-KR" dirty="0" smtClean="0"/>
+              <a:t> Xilinx IP port (</a:t>
+            </a:r>
+            <a:r>
+              <a:rPr lang="en-US" altLang="ko-KR" i="1" dirty="0" err="1" smtClean="0"/>
+              <a:t>init_xilinx_port</a:t>
+            </a:r>
+            <a:r>
+              <a:rPr lang="en-US" altLang="ko-KR" dirty="0" smtClean="0"/>
+              <a:t>)</a:t>
+            </a:r>
+          </a:p>
+          <a:p>
+            <a:pPr lvl="1">
+              <a:buFont typeface="Arial" panose="020B0604020202020204" pitchFamily="34" charset="0"/>
+              <a:buChar char="•"/>
+            </a:pPr>
+            <a:r>
+              <a:rPr lang="en-US" altLang="ko-KR" dirty="0" smtClean="0"/>
+              <a:t>Allocate </a:t>
+            </a:r>
+            <a:r>
+              <a:rPr lang="en-US" altLang="ko-KR" dirty="0" err="1" smtClean="0"/>
+              <a:t>netdev</a:t>
+            </a:r>
+            <a:r>
+              <a:rPr lang="en-US" altLang="ko-KR" dirty="0" smtClean="0"/>
+              <a:t> structure (</a:t>
+            </a:r>
+            <a:r>
+              <a:rPr lang="en-US" altLang="ko-KR" i="1" dirty="0" err="1" smtClean="0"/>
+              <a:t>alloc_netdev</a:t>
+            </a:r>
+            <a:r>
+              <a:rPr lang="en-US" altLang="ko-KR" i="1" dirty="0" smtClean="0"/>
+              <a:t> </a:t>
+            </a:r>
+            <a:r>
+              <a:rPr lang="en-US" altLang="ko-KR" dirty="0" smtClean="0"/>
+              <a:t>and </a:t>
+            </a:r>
+            <a:r>
+              <a:rPr lang="en-US" altLang="ko-KR" i="1" dirty="0" err="1" smtClean="0"/>
+              <a:t>emac_init</a:t>
+            </a:r>
+            <a:r>
+              <a:rPr lang="en-US" altLang="ko-KR" dirty="0" smtClean="0"/>
+              <a:t>)</a:t>
+            </a:r>
+          </a:p>
+          <a:p>
+            <a:pPr lvl="1">
+              <a:buFont typeface="Arial" panose="020B0604020202020204" pitchFamily="34" charset="0"/>
+              <a:buChar char="•"/>
+            </a:pPr>
+            <a:r>
+              <a:rPr lang="en-US" altLang="ko-KR" dirty="0" smtClean="0"/>
+              <a:t>Allocate </a:t>
+            </a:r>
+            <a:r>
+              <a:rPr lang="en-US" altLang="ko-KR" dirty="0" err="1" smtClean="0"/>
+              <a:t>priv</a:t>
+            </a:r>
+            <a:r>
+              <a:rPr lang="en-US" altLang="ko-KR" dirty="0" smtClean="0"/>
+              <a:t> structure (</a:t>
+            </a:r>
+            <a:r>
+              <a:rPr lang="en-US" altLang="ko-KR" i="1" dirty="0" err="1" smtClean="0"/>
+              <a:t>netdev_priv</a:t>
+            </a:r>
+            <a:r>
+              <a:rPr lang="en-US" altLang="ko-KR" dirty="0" smtClean="0"/>
+              <a:t> and </a:t>
+            </a:r>
+            <a:r>
+              <a:rPr lang="en-US" altLang="ko-KR" i="1" dirty="0" err="1" smtClean="0"/>
+              <a:t>memset</a:t>
+            </a:r>
+            <a:r>
+              <a:rPr lang="en-US" altLang="ko-KR" dirty="0" smtClean="0"/>
+              <a:t>)</a:t>
+            </a:r>
+          </a:p>
+        </p:txBody>
+      </p:sp>
+    </p:spTree>
+    <p:extLst>
+      <p:ext uri="{BB962C8B-B14F-4D97-AF65-F5344CB8AC3E}">
+        <p14:creationId xmlns:p14="http://schemas.microsoft.com/office/powerpoint/2010/main" val="3278514229"/>
+      </p:ext>
+    </p:extLst>
+  </p:cSld>
+  <p:clrMapOvr>
+    <a:masterClrMapping/>
+  </p:clrMapOvr>
+  <p:timing>
+    <p:tnLst>
+      <p:par>
+        <p:cTn id="1" dur="indefinite" restart="never" nodeType="tmRoot"/>
+      </p:par>
+    </p:tnLst>
+  </p:timing>
+</p:sld>
+</file>
+
+<file path=ppt/slides/slide7.xml><?xml version="1.0" encoding="utf-8"?>
+<p:sld xmlns:a="http://schemas.openxmlformats.org/drawingml/2006/main" xmlns:r="http://schemas.openxmlformats.org/officeDocument/2006/relationships" xmlns:p="http://schemas.openxmlformats.org/presentationml/2006/main">
+  <p:cSld>
+    <p:spTree>
+      <p:nvGrpSpPr>
+        <p:cNvPr id="1" name=""/>
+        <p:cNvGrpSpPr/>
+        <p:nvPr/>
+      </p:nvGrpSpPr>
+      <p:grpSpPr>
+        <a:xfrm>
+          <a:off x="0" y="0"/>
+          <a:ext cx="0" cy="0"/>
+          <a:chOff x="0" y="0"/>
+          <a:chExt cx="0" cy="0"/>
+        </a:xfrm>
+      </p:grpSpPr>
+      <p:sp>
+        <p:nvSpPr>
+          <p:cNvPr id="2" name="Title 1"/>
+          <p:cNvSpPr>
+            <a:spLocks noGrp="1"/>
+          </p:cNvSpPr>
+          <p:nvPr>
+            <p:ph type="title"/>
+          </p:nvPr>
+        </p:nvSpPr>
+        <p:spPr/>
+        <p:txBody>
+          <a:bodyPr/>
+          <a:lstStyle/>
+          <a:p>
+            <a:r>
+              <a:rPr lang="en-US" altLang="ko-KR" dirty="0" err="1" smtClean="0"/>
+              <a:t>init_xilinx_port</a:t>
+            </a:r>
+            <a:endParaRPr lang="ko-KR" altLang="en-US" sz="2800" dirty="0"/>
+          </a:p>
+        </p:txBody>
+      </p:sp>
+      <p:sp>
+        <p:nvSpPr>
+          <p:cNvPr id="3" name="Content Placeholder 2"/>
+          <p:cNvSpPr>
+            <a:spLocks noGrp="1"/>
+          </p:cNvSpPr>
+          <p:nvPr>
+            <p:ph idx="1"/>
+          </p:nvPr>
+        </p:nvSpPr>
+        <p:spPr/>
+        <p:txBody>
+          <a:bodyPr>
+            <a:normAutofit fontScale="92500" lnSpcReduction="20000"/>
+          </a:bodyPr>
+          <a:lstStyle/>
+          <a:p>
+            <a:pPr>
+              <a:buFont typeface="Arial" panose="020B0604020202020204" pitchFamily="34" charset="0"/>
+              <a:buChar char="•"/>
+            </a:pPr>
+            <a:r>
+              <a:rPr lang="en-US" altLang="ko-KR" dirty="0" smtClean="0"/>
+              <a:t> </a:t>
+            </a:r>
+            <a:r>
+              <a:rPr lang="en-US" altLang="ko-KR" dirty="0" smtClean="0"/>
+              <a:t>Called from </a:t>
+            </a:r>
+            <a:r>
+              <a:rPr lang="en-US" altLang="ko-KR" i="1" dirty="0" err="1" smtClean="0"/>
+              <a:t>emac_module</a:t>
+            </a:r>
+            <a:r>
+              <a:rPr lang="en-US" altLang="ko-KR" i="1" dirty="0" err="1" smtClean="0"/>
+              <a:t>_init</a:t>
+            </a:r>
+            <a:r>
+              <a:rPr lang="en-US" altLang="ko-KR" dirty="0" smtClean="0"/>
+              <a:t> to create an </a:t>
+            </a:r>
+            <a:r>
+              <a:rPr lang="en-US" altLang="ko-KR" dirty="0" err="1" smtClean="0"/>
+              <a:t>eMAC</a:t>
+            </a:r>
+            <a:r>
+              <a:rPr lang="en-US" altLang="ko-KR" dirty="0" smtClean="0"/>
+              <a:t> interface</a:t>
+            </a:r>
+          </a:p>
+          <a:p>
+            <a:pPr marL="457200" indent="-457200">
+              <a:buFont typeface="+mj-lt"/>
+              <a:buAutoNum type="arabicPeriod"/>
+            </a:pPr>
+            <a:r>
+              <a:rPr lang="en-US" altLang="ko-KR" dirty="0" smtClean="0"/>
+              <a:t>Get transmitter &amp; receiver address from GRB</a:t>
+            </a:r>
+          </a:p>
+          <a:p>
+            <a:pPr marL="457200" indent="-457200">
+              <a:buFont typeface="+mj-lt"/>
+              <a:buAutoNum type="arabicPeriod"/>
+            </a:pPr>
+            <a:r>
+              <a:rPr lang="en-US" altLang="ko-KR" dirty="0" smtClean="0"/>
+              <a:t>Disable TX/RX flow control of </a:t>
+            </a:r>
+            <a:r>
+              <a:rPr lang="en-US" altLang="ko-KR" dirty="0" err="1" smtClean="0"/>
+              <a:t>eMAC</a:t>
+            </a:r>
+            <a:r>
+              <a:rPr lang="en-US" altLang="ko-KR" dirty="0" smtClean="0"/>
+              <a:t> (GRB + 0x32C0)</a:t>
+            </a:r>
+          </a:p>
+          <a:p>
+            <a:pPr lvl="1">
+              <a:buFont typeface="Arial" panose="020B0604020202020204" pitchFamily="34" charset="0"/>
+              <a:buChar char="•"/>
+            </a:pPr>
+            <a:r>
+              <a:rPr lang="en-US" altLang="ko-KR" dirty="0" smtClean="0"/>
+              <a:t>Set top 3 bits of flow control configuration to zero</a:t>
+            </a:r>
+          </a:p>
+          <a:p>
+            <a:pPr marL="457200" indent="-457200">
+              <a:buFont typeface="+mj-lt"/>
+              <a:buAutoNum type="arabicPeriod"/>
+            </a:pPr>
+            <a:r>
+              <a:rPr lang="en-US" altLang="ko-KR" dirty="0" smtClean="0"/>
+              <a:t>Enable transmitter &amp; set to full duplex mode (GRB + 0x3280)</a:t>
+            </a:r>
+            <a:endParaRPr lang="en-US" altLang="ko-KR" b="1" dirty="0" smtClean="0"/>
+          </a:p>
+          <a:p>
+            <a:pPr lvl="1">
+              <a:buFont typeface="Arial" panose="020B0604020202020204" pitchFamily="34" charset="0"/>
+              <a:buChar char="•"/>
+            </a:pPr>
+            <a:r>
+              <a:rPr lang="en-US" altLang="ko-KR" dirty="0" smtClean="0"/>
+              <a:t>Half duplex (Bit 26) = 0</a:t>
+            </a:r>
+          </a:p>
+          <a:p>
+            <a:pPr lvl="1">
+              <a:buFont typeface="Arial" panose="020B0604020202020204" pitchFamily="34" charset="0"/>
+              <a:buChar char="•"/>
+            </a:pPr>
+            <a:r>
+              <a:rPr lang="en-US" altLang="ko-KR" dirty="0" smtClean="0"/>
+              <a:t>Transmit enable (Bit 28) = 1</a:t>
+            </a:r>
+          </a:p>
+          <a:p>
+            <a:pPr lvl="1">
+              <a:buFont typeface="Arial" panose="020B0604020202020204" pitchFamily="34" charset="0"/>
+              <a:buChar char="•"/>
+            </a:pPr>
+            <a:r>
+              <a:rPr lang="en-US" altLang="ko-KR" dirty="0" smtClean="0"/>
+              <a:t>Reset (Bit 31) = 0</a:t>
+            </a:r>
+          </a:p>
+          <a:p>
+            <a:pPr marL="457200" indent="-457200">
+              <a:buFont typeface="+mj-lt"/>
+              <a:buAutoNum type="arabicPeriod"/>
+            </a:pPr>
+            <a:r>
+              <a:rPr lang="en-US" altLang="ko-KR" dirty="0" smtClean="0"/>
+              <a:t>Enable receiver &amp; set to full duplex mode (GRB + 0x3240)</a:t>
+            </a:r>
+            <a:endParaRPr lang="en-US" altLang="ko-KR" b="1" dirty="0" smtClean="0"/>
+          </a:p>
+          <a:p>
+            <a:pPr lvl="1">
+              <a:buFont typeface="Arial" panose="020B0604020202020204" pitchFamily="34" charset="0"/>
+              <a:buChar char="•"/>
+            </a:pPr>
+            <a:r>
+              <a:rPr lang="en-US" altLang="ko-KR" dirty="0" smtClean="0"/>
+              <a:t>Length/type error check disable (Bit 25) = 1</a:t>
+            </a:r>
+          </a:p>
+          <a:p>
+            <a:pPr lvl="1">
+              <a:buFont typeface="Arial" panose="020B0604020202020204" pitchFamily="34" charset="0"/>
+              <a:buChar char="•"/>
+            </a:pPr>
+            <a:r>
+              <a:rPr lang="en-US" altLang="ko-KR" dirty="0" smtClean="0"/>
+              <a:t>Half duplex (Bit 26) = 0</a:t>
+            </a:r>
+          </a:p>
+          <a:p>
+            <a:pPr lvl="1">
+              <a:buFont typeface="Arial" panose="020B0604020202020204" pitchFamily="34" charset="0"/>
+              <a:buChar char="•"/>
+            </a:pPr>
+            <a:r>
+              <a:rPr lang="en-US" altLang="ko-KR" dirty="0" smtClean="0"/>
+              <a:t>Receiver enable (Bit 28) = 1</a:t>
+            </a:r>
+          </a:p>
+          <a:p>
+            <a:pPr lvl="1">
+              <a:buFont typeface="Arial" panose="020B0604020202020204" pitchFamily="34" charset="0"/>
+              <a:buChar char="•"/>
+            </a:pPr>
+            <a:r>
+              <a:rPr lang="en-US" altLang="ko-KR" dirty="0" smtClean="0"/>
+              <a:t>Reset (Bit 31) = 0</a:t>
+            </a:r>
+            <a:endParaRPr lang="en-US" altLang="ko-KR" dirty="0"/>
+          </a:p>
+        </p:txBody>
+      </p:sp>
+    </p:spTree>
+    <p:extLst>
+      <p:ext uri="{BB962C8B-B14F-4D97-AF65-F5344CB8AC3E}">
+        <p14:creationId xmlns:p14="http://schemas.microsoft.com/office/powerpoint/2010/main" val="2491032252"/>
+      </p:ext>
+    </p:extLst>
+  </p:cSld>
+  <p:clrMapOvr>
+    <a:masterClrMapping/>
+  </p:clrMapOvr>
+  <p:timing>
+    <p:tnLst>
+      <p:par>
+        <p:cTn id="1" dur="indefinite" restart="never" nodeType="tmRoot"/>
+      </p:par>
+    </p:tnLst>
+  </p:timing>
+</p:sld>
+</file>
+
+<file path=ppt/slides/slide8.xml><?xml version="1.0" encoding="utf-8"?>
+<p:sld xmlns:a="http://schemas.openxmlformats.org/drawingml/2006/main" xmlns:r="http://schemas.openxmlformats.org/officeDocument/2006/relationships" xmlns:p="http://schemas.openxmlformats.org/presentationml/2006/main">
+  <p:cSld>
+    <p:spTree>
+      <p:nvGrpSpPr>
+        <p:cNvPr id="1" name=""/>
+        <p:cNvGrpSpPr/>
+        <p:nvPr/>
+      </p:nvGrpSpPr>
+      <p:grpSpPr>
+        <a:xfrm>
+          <a:off x="0" y="0"/>
+          <a:ext cx="0" cy="0"/>
+          <a:chOff x="0" y="0"/>
+          <a:chExt cx="0" cy="0"/>
+        </a:xfrm>
+      </p:grpSpPr>
+      <p:sp>
+        <p:nvSpPr>
+          <p:cNvPr id="2" name="Title 1"/>
+          <p:cNvSpPr>
+            <a:spLocks noGrp="1"/>
+          </p:cNvSpPr>
+          <p:nvPr>
+            <p:ph type="title"/>
+          </p:nvPr>
+        </p:nvSpPr>
+        <p:spPr/>
+        <p:txBody>
+          <a:bodyPr/>
+          <a:lstStyle/>
+          <a:p>
+            <a:r>
+              <a:rPr lang="en-US" altLang="ko-KR" dirty="0" err="1" smtClean="0"/>
+              <a:t>init_xilinx_port</a:t>
+            </a:r>
+            <a:endParaRPr lang="ko-KR" altLang="en-US" sz="2800" dirty="0"/>
+          </a:p>
+        </p:txBody>
+      </p:sp>
+      <p:sp>
+        <p:nvSpPr>
+          <p:cNvPr id="3" name="Content Placeholder 2"/>
+          <p:cNvSpPr>
+            <a:spLocks noGrp="1"/>
+          </p:cNvSpPr>
+          <p:nvPr>
+            <p:ph idx="1"/>
+          </p:nvPr>
+        </p:nvSpPr>
+        <p:spPr/>
+        <p:txBody>
+          <a:bodyPr>
+            <a:normAutofit/>
+          </a:bodyPr>
+          <a:lstStyle/>
+          <a:p>
+            <a:pPr marL="457200" indent="-457200">
+              <a:buFont typeface="+mj-lt"/>
+              <a:buAutoNum type="arabicPeriod" startAt="5"/>
+            </a:pPr>
+            <a:r>
+              <a:rPr lang="en-US" altLang="ko-KR" dirty="0" smtClean="0"/>
+              <a:t>Set speed of </a:t>
+            </a:r>
+            <a:r>
+              <a:rPr lang="en-US" altLang="ko-KR" dirty="0" err="1" smtClean="0"/>
+              <a:t>eMAC</a:t>
+            </a:r>
+            <a:r>
+              <a:rPr lang="en-US" altLang="ko-KR" dirty="0" smtClean="0"/>
+              <a:t> to 1Gb/s</a:t>
+            </a:r>
+            <a:r>
+              <a:rPr lang="en-US" altLang="ko-KR" b="1" dirty="0" smtClean="0"/>
+              <a:t> </a:t>
+            </a:r>
+            <a:r>
+              <a:rPr lang="en-US" altLang="ko-KR" dirty="0" smtClean="0"/>
+              <a:t>(GRB + 0x3300)</a:t>
+            </a:r>
+            <a:endParaRPr lang="en-US" altLang="ko-KR" b="1" dirty="0" smtClean="0"/>
+          </a:p>
+          <a:p>
+            <a:pPr lvl="1">
+              <a:buFont typeface="Arial" panose="020B0604020202020204" pitchFamily="34" charset="0"/>
+              <a:buChar char="•"/>
+            </a:pPr>
+            <a:r>
+              <a:rPr lang="en-US" altLang="ko-KR" dirty="0" smtClean="0"/>
+              <a:t>Bit 31 = 1, Bit 30 = 0</a:t>
+            </a:r>
+            <a:endParaRPr lang="en-US" altLang="ko-KR" dirty="0" smtClean="0"/>
+          </a:p>
+          <a:p>
+            <a:pPr marL="457200" indent="-457200">
+              <a:buFont typeface="+mj-lt"/>
+              <a:buAutoNum type="arabicPeriod" startAt="5"/>
+            </a:pPr>
+            <a:r>
+              <a:rPr lang="en-US" altLang="ko-KR" dirty="0" smtClean="0"/>
+              <a:t>Set to promiscuous mode (GRB + 0x3390)</a:t>
+            </a:r>
+            <a:endParaRPr lang="en-US" altLang="ko-KR" b="1" dirty="0" smtClean="0"/>
+          </a:p>
+          <a:p>
+            <a:pPr lvl="1">
+              <a:buFont typeface="Arial" panose="020B0604020202020204" pitchFamily="34" charset="0"/>
+              <a:buChar char="•"/>
+            </a:pPr>
+            <a:r>
+              <a:rPr lang="en-US" altLang="ko-KR" dirty="0" smtClean="0"/>
+              <a:t>Bit 31 = 1</a:t>
+            </a:r>
+            <a:endParaRPr lang="en-US" altLang="ko-KR" dirty="0"/>
+          </a:p>
+          <a:p>
+            <a:pPr lvl="0">
+              <a:buClr>
+                <a:srgbClr val="D34817"/>
+              </a:buClr>
+              <a:buFont typeface="Arial" panose="020B0604020202020204" pitchFamily="34" charset="0"/>
+              <a:buChar char="•"/>
+            </a:pPr>
+            <a:r>
+              <a:rPr lang="en-US" altLang="ko-KR" dirty="0">
+                <a:solidFill>
+                  <a:prstClr val="black">
+                    <a:lumMod val="75000"/>
+                    <a:lumOff val="25000"/>
+                  </a:prstClr>
+                </a:solidFill>
+              </a:rPr>
+              <a:t> </a:t>
+            </a:r>
+            <a:r>
+              <a:rPr lang="en-US" altLang="ko-KR" dirty="0" smtClean="0"/>
+              <a:t>Be sure to conduct </a:t>
+            </a:r>
+            <a:r>
+              <a:rPr lang="en-US" altLang="ko-KR" b="1" dirty="0" smtClean="0"/>
+              <a:t>sanity checks</a:t>
+            </a:r>
+            <a:r>
+              <a:rPr lang="en-US" altLang="ko-KR" dirty="0" smtClean="0"/>
+              <a:t> after changing register values</a:t>
+            </a:r>
+            <a:endParaRPr lang="en-US" altLang="ko-KR" dirty="0"/>
+          </a:p>
+        </p:txBody>
+      </p:sp>
+    </p:spTree>
+    <p:extLst>
+      <p:ext uri="{BB962C8B-B14F-4D97-AF65-F5344CB8AC3E}">
+        <p14:creationId xmlns:p14="http://schemas.microsoft.com/office/powerpoint/2010/main" val="3128484530"/>
+      </p:ext>
+    </p:extLst>
+  </p:cSld>
+  <p:clrMapOvr>
+    <a:masterClrMapping/>
+  </p:clrMapOvr>
+  <p:timing>
+    <p:tnLst>
+      <p:par>
+        <p:cTn id="1" dur="indefinite" restart="never" nodeType="tmRoot"/>
+      </p:par>
+    </p:tnLst>
+  </p:timing>
+</p:sld>
+</file>
+
+<file path=ppt/slides/slide9.xml><?xml version="1.0" encoding="utf-8"?>
+<p:sld xmlns:a="http://schemas.openxmlformats.org/drawingml/2006/main" xmlns:r="http://schemas.openxmlformats.org/officeDocument/2006/relationships" xmlns:p="http://schemas.openxmlformats.org/presentationml/2006/main">
+  <p:cSld>
+    <p:spTree>
+      <p:nvGrpSpPr>
+        <p:cNvPr id="1" name=""/>
+        <p:cNvGrpSpPr/>
+        <p:nvPr/>
+      </p:nvGrpSpPr>
+      <p:grpSpPr>
+        <a:xfrm>
+          <a:off x="0" y="0"/>
+          <a:ext cx="0" cy="0"/>
+          <a:chOff x="0" y="0"/>
+          <a:chExt cx="0" cy="0"/>
+        </a:xfrm>
+      </p:grpSpPr>
+      <p:sp>
+        <p:nvSpPr>
+          <p:cNvPr id="2" name="Title 1"/>
+          <p:cNvSpPr>
+            <a:spLocks noGrp="1"/>
+          </p:cNvSpPr>
+          <p:nvPr>
+            <p:ph type="title"/>
+          </p:nvPr>
+        </p:nvSpPr>
+        <p:spPr/>
+        <p:txBody>
+          <a:bodyPr/>
+          <a:lstStyle/>
+          <a:p>
+            <a:r>
+              <a:rPr lang="en-US" altLang="ko-KR" dirty="0" err="1" smtClean="0"/>
+              <a:t>emac_init</a:t>
+            </a:r>
+            <a:endParaRPr lang="ko-KR" altLang="en-US" sz="2800" dirty="0"/>
+          </a:p>
+        </p:txBody>
+      </p:sp>
+      <p:sp>
+        <p:nvSpPr>
+          <p:cNvPr id="3" name="Content Placeholder 2"/>
+          <p:cNvSpPr>
+            <a:spLocks noGrp="1"/>
+          </p:cNvSpPr>
+          <p:nvPr>
+            <p:ph idx="1"/>
+          </p:nvPr>
+        </p:nvSpPr>
+        <p:spPr/>
+        <p:txBody>
+          <a:bodyPr>
+            <a:normAutofit/>
+          </a:bodyPr>
+          <a:lstStyle/>
+          <a:p>
+            <a:pPr>
+              <a:buFont typeface="Arial" panose="020B0604020202020204" pitchFamily="34" charset="0"/>
+              <a:buChar char="•"/>
+            </a:pPr>
+            <a:r>
+              <a:rPr lang="en-US" altLang="ko-KR" dirty="0" smtClean="0"/>
+              <a:t> </a:t>
+            </a:r>
+            <a:r>
+              <a:rPr lang="en-US" altLang="ko-KR" dirty="0" smtClean="0"/>
+              <a:t>Called by </a:t>
+            </a:r>
+            <a:r>
+              <a:rPr lang="en-US" altLang="ko-KR" i="1" dirty="0" err="1" smtClean="0"/>
+              <a:t>alloc_netdev</a:t>
+            </a:r>
+            <a:endParaRPr lang="en-US" altLang="ko-KR" i="1" dirty="0"/>
+          </a:p>
+          <a:p>
+            <a:pPr>
+              <a:buFont typeface="Arial" panose="020B0604020202020204" pitchFamily="34" charset="0"/>
+              <a:buChar char="•"/>
+            </a:pPr>
+            <a:r>
+              <a:rPr lang="en-US" altLang="ko-KR" i="1" dirty="0" smtClean="0"/>
+              <a:t> </a:t>
+            </a:r>
+            <a:r>
+              <a:rPr lang="en-US" altLang="ko-KR" dirty="0" smtClean="0"/>
+              <a:t>Setup </a:t>
+            </a:r>
+            <a:r>
+              <a:rPr lang="en-US" altLang="ko-KR" i="1" dirty="0" err="1" smtClean="0"/>
+              <a:t>net_device</a:t>
+            </a:r>
+            <a:r>
+              <a:rPr lang="en-US" altLang="ko-KR" dirty="0" smtClean="0"/>
+              <a:t> structure</a:t>
+            </a:r>
+          </a:p>
+          <a:p>
+            <a:pPr lvl="1">
+              <a:buFont typeface="Arial" panose="020B0604020202020204" pitchFamily="34" charset="0"/>
+              <a:buChar char="•"/>
+            </a:pPr>
+            <a:r>
+              <a:rPr lang="en-US" altLang="ko-KR" i="1" dirty="0" err="1" smtClean="0"/>
+              <a:t>ether_setup</a:t>
+            </a:r>
+            <a:r>
+              <a:rPr lang="en-US" altLang="ko-KR" i="1" dirty="0" smtClean="0"/>
+              <a:t> </a:t>
+            </a:r>
+            <a:r>
+              <a:rPr lang="en-US" altLang="ko-KR" dirty="0" smtClean="0"/>
+              <a:t>to setup standard </a:t>
+            </a:r>
+            <a:r>
+              <a:rPr lang="en-US" altLang="ko-KR" dirty="0" err="1" smtClean="0"/>
+              <a:t>infos</a:t>
+            </a:r>
+            <a:endParaRPr lang="en-US" altLang="ko-KR" i="1" dirty="0" smtClean="0"/>
+          </a:p>
+          <a:p>
+            <a:pPr lvl="1">
+              <a:buFont typeface="Arial" panose="020B0604020202020204" pitchFamily="34" charset="0"/>
+              <a:buChar char="•"/>
+            </a:pPr>
+            <a:r>
+              <a:rPr lang="en-US" altLang="ko-KR" dirty="0" smtClean="0"/>
+              <a:t>Assign driver specific functions (open, stop, </a:t>
+            </a:r>
+            <a:r>
+              <a:rPr lang="en-US" altLang="ko-KR" dirty="0" err="1" smtClean="0"/>
+              <a:t>ioctl</a:t>
+            </a:r>
+            <a:r>
+              <a:rPr lang="en-US" altLang="ko-KR" dirty="0" smtClean="0"/>
+              <a:t>, stats, …)</a:t>
+            </a:r>
+          </a:p>
+        </p:txBody>
+      </p:sp>
+      <p:pic>
+        <p:nvPicPr>
+          <p:cNvPr id="4" name="Picture 3"/>
+          <p:cNvPicPr>
+            <a:picLocks noChangeAspect="1"/>
+          </p:cNvPicPr>
+          <p:nvPr/>
+        </p:nvPicPr>
+        <p:blipFill>
+          <a:blip r:embed="rId2"/>
+          <a:stretch>
+            <a:fillRect/>
+          </a:stretch>
+        </p:blipFill>
+        <p:spPr>
+          <a:xfrm>
+            <a:off x="7551719" y="1948391"/>
+            <a:ext cx="3038475" cy="4029075"/>
+          </a:xfrm>
+          <a:prstGeom prst="rect">
+            <a:avLst/>
+          </a:prstGeom>
+        </p:spPr>
+      </p:pic>
+    </p:spTree>
+    <p:extLst>
+      <p:ext uri="{BB962C8B-B14F-4D97-AF65-F5344CB8AC3E}">
+        <p14:creationId xmlns:p14="http://schemas.microsoft.com/office/powerpoint/2010/main" val="3487004383"/>
       </p:ext>
     </p:extLst>
   </p:cSld>

</xml_diff>